<commit_message>
Ajustado valor do IRR futuro no template do infográfico
</commit_message>
<xml_diff>
--- a/templates/Infográficos.pptx
+++ b/templates/Infográficos.pptx
@@ -9139,7 +9139,7 @@
           <a:p>
             <a:fld id="{9933228B-B5BA-5844-9E71-2BF823917A71}" type="datetimeFigureOut">
               <a:rPr lang="pt-BR" smtClean="0"/>
-              <a:t>16/06/2024</a:t>
+              <a:t>20/06/2024</a:t>
             </a:fld>
             <a:endParaRPr lang="pt-BR"/>
           </a:p>
@@ -28692,8 +28692,8 @@
         </p:nvSpPr>
         <p:spPr>
           <a:xfrm>
-            <a:off x="9304381" y="3676856"/>
-            <a:ext cx="1428221" cy="353943"/>
+            <a:off x="9360367" y="3676856"/>
+            <a:ext cx="2012578" cy="353943"/>
           </a:xfrm>
           <a:prstGeom prst="rect">
             <a:avLst/>
@@ -28715,7 +28715,7 @@
                 <a:ea typeface="Verdana" panose="020B0604030504040204" pitchFamily="34" charset="0"/>
                 <a:cs typeface="Calibri" panose="020F0502020204030204" pitchFamily="34" charset="0"/>
               </a:rPr>
-              <a:t>&gt; YY% a YY%</a:t>
+              <a:t>YY% a YY%</a:t>
             </a:r>
           </a:p>
         </p:txBody>
@@ -28734,8 +28734,8 @@
         </p:nvSpPr>
         <p:spPr>
           <a:xfrm>
-            <a:off x="9094741" y="4344735"/>
-            <a:ext cx="1298140" cy="353943"/>
+            <a:off x="9094740" y="4344735"/>
+            <a:ext cx="2012577" cy="353943"/>
           </a:xfrm>
           <a:prstGeom prst="rect">
             <a:avLst/>
@@ -29532,6 +29532,243 @@
                 <a:cs typeface="Calibri" panose="020F0502020204030204" pitchFamily="34" charset="0"/>
               </a:rPr>
               <a:t>Eq/ano</a:t>
+            </a:r>
+          </a:p>
+        </p:txBody>
+      </p:sp>
+      <p:sp>
+        <p:nvSpPr>
+          <p:cNvPr id="31" name="Rectangle 30">
+            <a:extLst>
+              <a:ext uri="{FF2B5EF4-FFF2-40B4-BE49-F238E27FC236}">
+                <a16:creationId xmlns:a16="http://schemas.microsoft.com/office/drawing/2014/main" id="{935F83B9-9AED-A7FB-A8E9-0056034A894C}"/>
+              </a:ext>
+            </a:extLst>
+          </p:cNvPr>
+          <p:cNvSpPr/>
+          <p:nvPr/>
+        </p:nvSpPr>
+        <p:spPr>
+          <a:xfrm>
+            <a:off x="1597931" y="2945672"/>
+            <a:ext cx="1309801" cy="220131"/>
+          </a:xfrm>
+          <a:prstGeom prst="rect">
+            <a:avLst/>
+          </a:prstGeom>
+          <a:solidFill>
+            <a:schemeClr val="bg1"/>
+          </a:solidFill>
+          <a:ln>
+            <a:noFill/>
+          </a:ln>
+        </p:spPr>
+        <p:style>
+          <a:lnRef idx="2">
+            <a:schemeClr val="accent1">
+              <a:shade val="15000"/>
+            </a:schemeClr>
+          </a:lnRef>
+          <a:fillRef idx="1">
+            <a:schemeClr val="accent1"/>
+          </a:fillRef>
+          <a:effectRef idx="0">
+            <a:schemeClr val="accent1"/>
+          </a:effectRef>
+          <a:fontRef idx="minor">
+            <a:schemeClr val="lt1"/>
+          </a:fontRef>
+        </p:style>
+        <p:txBody>
+          <a:bodyPr rtlCol="0" anchor="ctr"/>
+          <a:lstStyle/>
+          <a:p>
+            <a:pPr algn="ctr"/>
+            <a:endParaRPr lang="en-US"/>
+          </a:p>
+        </p:txBody>
+      </p:sp>
+      <p:sp>
+        <p:nvSpPr>
+          <p:cNvPr id="30" name="CaixaDeTexto 19">
+            <a:extLst>
+              <a:ext uri="{FF2B5EF4-FFF2-40B4-BE49-F238E27FC236}">
+                <a16:creationId xmlns:a16="http://schemas.microsoft.com/office/drawing/2014/main" id="{1BD1FD8E-BE75-CCF8-6DA2-AA8C3732A417}"/>
+              </a:ext>
+            </a:extLst>
+          </p:cNvPr>
+          <p:cNvSpPr txBox="1"/>
+          <p:nvPr/>
+        </p:nvSpPr>
+        <p:spPr>
+          <a:xfrm>
+            <a:off x="367036" y="2933540"/>
+            <a:ext cx="2529041" cy="276999"/>
+          </a:xfrm>
+          <a:prstGeom prst="rect">
+            <a:avLst/>
+          </a:prstGeom>
+          <a:noFill/>
+        </p:spPr>
+        <p:txBody>
+          <a:bodyPr wrap="square" rtlCol="0">
+            <a:spAutoFit/>
+          </a:bodyPr>
+          <a:lstStyle/>
+          <a:p>
+            <a:pPr algn="r"/>
+            <a:r>
+              <a:rPr lang="pt-BR" sz="1200" b="1" dirty="0">
+                <a:solidFill>
+                  <a:srgbClr val="2390A1"/>
+                </a:solidFill>
+                <a:latin typeface="Arial Black" panose="020B0A04020102020204" pitchFamily="34" charset="0"/>
+              </a:rPr>
+              <a:t>DE RESÍDUOS ORGÂNICOS</a:t>
+            </a:r>
+          </a:p>
+        </p:txBody>
+      </p:sp>
+      <p:sp>
+        <p:nvSpPr>
+          <p:cNvPr id="33" name="Rectangle 32">
+            <a:extLst>
+              <a:ext uri="{FF2B5EF4-FFF2-40B4-BE49-F238E27FC236}">
+                <a16:creationId xmlns:a16="http://schemas.microsoft.com/office/drawing/2014/main" id="{E5983654-DC57-F95A-29A7-DC2655BE612F}"/>
+              </a:ext>
+            </a:extLst>
+          </p:cNvPr>
+          <p:cNvSpPr/>
+          <p:nvPr/>
+        </p:nvSpPr>
+        <p:spPr>
+          <a:xfrm>
+            <a:off x="9442082" y="3544110"/>
+            <a:ext cx="1298140" cy="162889"/>
+          </a:xfrm>
+          <a:prstGeom prst="rect">
+            <a:avLst/>
+          </a:prstGeom>
+          <a:solidFill>
+            <a:schemeClr val="bg1"/>
+          </a:solidFill>
+          <a:ln>
+            <a:noFill/>
+          </a:ln>
+        </p:spPr>
+        <p:style>
+          <a:lnRef idx="2">
+            <a:schemeClr val="accent1">
+              <a:shade val="15000"/>
+            </a:schemeClr>
+          </a:lnRef>
+          <a:fillRef idx="1">
+            <a:schemeClr val="accent1"/>
+          </a:fillRef>
+          <a:effectRef idx="0">
+            <a:schemeClr val="accent1"/>
+          </a:effectRef>
+          <a:fontRef idx="minor">
+            <a:schemeClr val="lt1"/>
+          </a:fontRef>
+        </p:style>
+        <p:txBody>
+          <a:bodyPr rtlCol="0" anchor="ctr"/>
+          <a:lstStyle/>
+          <a:p>
+            <a:pPr algn="ctr"/>
+            <a:endParaRPr lang="en-US"/>
+          </a:p>
+        </p:txBody>
+      </p:sp>
+      <p:sp>
+        <p:nvSpPr>
+          <p:cNvPr id="34" name="Oval 33">
+            <a:extLst>
+              <a:ext uri="{FF2B5EF4-FFF2-40B4-BE49-F238E27FC236}">
+                <a16:creationId xmlns:a16="http://schemas.microsoft.com/office/drawing/2014/main" id="{0A3D8084-539F-B401-CDF3-7E85F05DFB7D}"/>
+              </a:ext>
+            </a:extLst>
+          </p:cNvPr>
+          <p:cNvSpPr/>
+          <p:nvPr/>
+        </p:nvSpPr>
+        <p:spPr>
+          <a:xfrm rot="1384220">
+            <a:off x="10045433" y="3517983"/>
+            <a:ext cx="130959" cy="97103"/>
+          </a:xfrm>
+          <a:prstGeom prst="ellipse">
+            <a:avLst/>
+          </a:prstGeom>
+          <a:solidFill>
+            <a:schemeClr val="bg1"/>
+          </a:solidFill>
+          <a:ln>
+            <a:noFill/>
+          </a:ln>
+        </p:spPr>
+        <p:style>
+          <a:lnRef idx="2">
+            <a:schemeClr val="accent1">
+              <a:shade val="15000"/>
+            </a:schemeClr>
+          </a:lnRef>
+          <a:fillRef idx="1">
+            <a:schemeClr val="accent1"/>
+          </a:fillRef>
+          <a:effectRef idx="0">
+            <a:schemeClr val="accent1"/>
+          </a:effectRef>
+          <a:fontRef idx="minor">
+            <a:schemeClr val="lt1"/>
+          </a:fontRef>
+        </p:style>
+        <p:txBody>
+          <a:bodyPr rtlCol="0" anchor="ctr"/>
+          <a:lstStyle/>
+          <a:p>
+            <a:pPr algn="ctr"/>
+            <a:endParaRPr lang="en-US"/>
+          </a:p>
+        </p:txBody>
+      </p:sp>
+      <p:sp>
+        <p:nvSpPr>
+          <p:cNvPr id="35" name="CaixaDeTexto 30">
+            <a:extLst>
+              <a:ext uri="{FF2B5EF4-FFF2-40B4-BE49-F238E27FC236}">
+                <a16:creationId xmlns:a16="http://schemas.microsoft.com/office/drawing/2014/main" id="{72CF5B7A-49CE-C430-446A-956B84C7986D}"/>
+              </a:ext>
+            </a:extLst>
+          </p:cNvPr>
+          <p:cNvSpPr txBox="1"/>
+          <p:nvPr/>
+        </p:nvSpPr>
+        <p:spPr>
+          <a:xfrm>
+            <a:off x="9345714" y="3478491"/>
+            <a:ext cx="2529041" cy="276999"/>
+          </a:xfrm>
+          <a:prstGeom prst="rect">
+            <a:avLst/>
+          </a:prstGeom>
+          <a:noFill/>
+        </p:spPr>
+        <p:txBody>
+          <a:bodyPr wrap="square" rtlCol="0">
+            <a:spAutoFit/>
+          </a:bodyPr>
+          <a:lstStyle/>
+          <a:p>
+            <a:r>
+              <a:rPr lang="pt-BR" sz="1200" b="1" dirty="0">
+                <a:solidFill>
+                  <a:srgbClr val="F47F23"/>
+                </a:solidFill>
+                <a:latin typeface="Arial Black" panose="020B0A04020102020204" pitchFamily="34" charset="0"/>
+              </a:rPr>
+              <a:t>DE RESÍDUOS ORGÂNICOS</a:t>
             </a:r>
           </a:p>
         </p:txBody>

</xml_diff>

<commit_message>
Ajustado duas contas que estavam erradas: rejeitos e repasse de receitas
</commit_message>
<xml_diff>
--- a/templates/Infográficos.pptx
+++ b/templates/Infográficos.pptx
@@ -134,7 +134,7 @@
 <file path=ppt/charts/chart1.xml><?xml version="1.0" encoding="utf-8"?>
 <c:chartSpace xmlns:c="http://schemas.openxmlformats.org/drawingml/2006/chart" xmlns:a="http://schemas.openxmlformats.org/drawingml/2006/main" xmlns:r="http://schemas.openxmlformats.org/officeDocument/2006/relationships" xmlns:c16r2="http://schemas.microsoft.com/office/drawing/2015/06/chart">
   <c:date1904 val="0"/>
-  <c:lang val="en-US"/>
+  <c:lang val="pt-BR"/>
   <c:roundedCorners val="0"/>
   <mc:AlternateContent xmlns:mc="http://schemas.openxmlformats.org/markup-compatibility/2006">
     <mc:Choice xmlns:c14="http://schemas.microsoft.com/office/drawing/2007/8/2/chart" Requires="c14">
@@ -298,7 +298,7 @@
                       <a:latin typeface="Bebas Kai" panose="04050603020B02020204" pitchFamily="82" charset="0"/>
                     </a:defRPr>
                   </a:pPr>
-                  <a:endParaRPr lang="en-US"/>
+                  <a:endParaRPr lang="pt-BR"/>
                 </a:p>
               </c:txPr>
               <c:dLblPos val="inEnd"/>
@@ -351,7 +351,7 @@
                       <a:cs typeface="+mn-cs"/>
                     </a:defRPr>
                   </a:pPr>
-                  <a:endParaRPr lang="en-US"/>
+                  <a:endParaRPr lang="pt-BR"/>
                 </a:p>
               </c:txPr>
               <c:dLblPos val="inEnd"/>
@@ -402,7 +402,7 @@
                     <a:cs typeface="+mn-cs"/>
                   </a:defRPr>
                 </a:pPr>
-                <a:endParaRPr lang="en-US"/>
+                <a:endParaRPr lang="pt-BR"/>
               </a:p>
             </c:txPr>
             <c:dLblPos val="inEnd"/>
@@ -617,9 +617,9 @@
                       <a:pPr>
                         <a:defRPr sz="2200"/>
                       </a:pPr>
-                      <a:t>[VALUE]</a:t>
+                      <a:t>[VALOR]</a:t>
                     </a:fld>
-                    <a:endParaRPr lang="en-US"/>
+                    <a:endParaRPr lang="pt-BR"/>
                   </a:p>
                 </c:rich>
               </c:tx>
@@ -687,7 +687,7 @@
                       <a:cs typeface="+mn-cs"/>
                     </a:defRPr>
                   </a:pPr>
-                  <a:endParaRPr lang="en-US"/>
+                  <a:endParaRPr lang="pt-BR"/>
                 </a:p>
               </c:txPr>
               <c:dLblPos val="inEnd"/>
@@ -740,7 +740,7 @@
                       <a:latin typeface="Bebas Kai" panose="04050603020B02020204" pitchFamily="82" charset="0"/>
                     </a:defRPr>
                   </a:pPr>
-                  <a:endParaRPr lang="en-US"/>
+                  <a:endParaRPr lang="pt-BR"/>
                 </a:p>
               </c:txPr>
               <c:dLblPos val="ctr"/>
@@ -804,9 +804,9 @@
                           <a:cs typeface="+mn-cs"/>
                         </a:defRPr>
                       </a:pPr>
-                      <a:t>[VALUE]</a:t>
+                      <a:t>[VALOR]</a:t>
                     </a:fld>
-                    <a:endParaRPr lang="en-US"/>
+                    <a:endParaRPr lang="pt-BR"/>
                   </a:p>
                 </c:rich>
               </c:tx>
@@ -868,7 +868,7 @@
                     <a:cs typeface="+mn-cs"/>
                   </a:defRPr>
                 </a:pPr>
-                <a:endParaRPr lang="en-US"/>
+                <a:endParaRPr lang="pt-BR"/>
               </a:p>
             </c:txPr>
             <c:dLblPos val="inEnd"/>
@@ -1027,7 +1027,7 @@
       <a:pPr>
         <a:defRPr/>
       </a:pPr>
-      <a:endParaRPr lang="en-US"/>
+      <a:endParaRPr lang="pt-BR"/>
     </a:p>
   </c:txPr>
   <c:externalData r:id="rId1">
@@ -1039,7 +1039,7 @@
 <file path=ppt/charts/chart2.xml><?xml version="1.0" encoding="utf-8"?>
 <c:chartSpace xmlns:c="http://schemas.openxmlformats.org/drawingml/2006/chart" xmlns:a="http://schemas.openxmlformats.org/drawingml/2006/main" xmlns:r="http://schemas.openxmlformats.org/officeDocument/2006/relationships" xmlns:c16r2="http://schemas.microsoft.com/office/drawing/2015/06/chart">
   <c:date1904 val="0"/>
-  <c:lang val="en-US"/>
+  <c:lang val="pt-BR"/>
   <c:roundedCorners val="0"/>
   <mc:AlternateContent xmlns:mc="http://schemas.openxmlformats.org/markup-compatibility/2006">
     <mc:Choice xmlns:c14="http://schemas.microsoft.com/office/drawing/2007/8/2/chart" Requires="c14">
@@ -1203,7 +1203,7 @@
                       <a:latin typeface="Bebas Kai" panose="04050603020B02020204" pitchFamily="82" charset="0"/>
                     </a:defRPr>
                   </a:pPr>
-                  <a:endParaRPr lang="en-US"/>
+                  <a:endParaRPr lang="pt-BR"/>
                 </a:p>
               </c:txPr>
               <c:dLblPos val="inEnd"/>
@@ -1256,7 +1256,7 @@
                       <a:cs typeface="+mn-cs"/>
                     </a:defRPr>
                   </a:pPr>
-                  <a:endParaRPr lang="en-US"/>
+                  <a:endParaRPr lang="pt-BR"/>
                 </a:p>
               </c:txPr>
               <c:dLblPos val="inEnd"/>
@@ -1307,7 +1307,7 @@
                     <a:cs typeface="+mn-cs"/>
                   </a:defRPr>
                 </a:pPr>
-                <a:endParaRPr lang="en-US"/>
+                <a:endParaRPr lang="pt-BR"/>
               </a:p>
             </c:txPr>
             <c:dLblPos val="inEnd"/>
@@ -1522,9 +1522,9 @@
                       <a:pPr>
                         <a:defRPr sz="2200"/>
                       </a:pPr>
-                      <a:t>[VALUE]</a:t>
+                      <a:t>[VALOR]</a:t>
                     </a:fld>
-                    <a:endParaRPr lang="en-US"/>
+                    <a:endParaRPr lang="pt-BR"/>
                   </a:p>
                 </c:rich>
               </c:tx>
@@ -1592,7 +1592,7 @@
                       <a:cs typeface="+mn-cs"/>
                     </a:defRPr>
                   </a:pPr>
-                  <a:endParaRPr lang="en-US"/>
+                  <a:endParaRPr lang="pt-BR"/>
                 </a:p>
               </c:txPr>
               <c:dLblPos val="inEnd"/>
@@ -1645,7 +1645,7 @@
                       <a:latin typeface="Bebas Kai" panose="04050603020B02020204" pitchFamily="82" charset="0"/>
                     </a:defRPr>
                   </a:pPr>
-                  <a:endParaRPr lang="en-US"/>
+                  <a:endParaRPr lang="pt-BR"/>
                 </a:p>
               </c:txPr>
               <c:dLblPos val="ctr"/>
@@ -1709,9 +1709,9 @@
                           <a:cs typeface="+mn-cs"/>
                         </a:defRPr>
                       </a:pPr>
-                      <a:t>[VALUE]</a:t>
+                      <a:t>[VALOR]</a:t>
                     </a:fld>
-                    <a:endParaRPr lang="en-US"/>
+                    <a:endParaRPr lang="pt-BR"/>
                   </a:p>
                 </c:rich>
               </c:tx>
@@ -1773,7 +1773,7 @@
                     <a:cs typeface="+mn-cs"/>
                   </a:defRPr>
                 </a:pPr>
-                <a:endParaRPr lang="en-US"/>
+                <a:endParaRPr lang="pt-BR"/>
               </a:p>
             </c:txPr>
             <c:dLblPos val="inEnd"/>
@@ -1932,7 +1932,7 @@
       <a:pPr>
         <a:defRPr/>
       </a:pPr>
-      <a:endParaRPr lang="en-US"/>
+      <a:endParaRPr lang="pt-BR"/>
     </a:p>
   </c:txPr>
   <c:externalData r:id="rId1">
@@ -1944,7 +1944,7 @@
 <file path=ppt/charts/chart3.xml><?xml version="1.0" encoding="utf-8"?>
 <c:chartSpace xmlns:c="http://schemas.openxmlformats.org/drawingml/2006/chart" xmlns:a="http://schemas.openxmlformats.org/drawingml/2006/main" xmlns:r="http://schemas.openxmlformats.org/officeDocument/2006/relationships" xmlns:c16r2="http://schemas.microsoft.com/office/drawing/2015/06/chart">
   <c:date1904 val="0"/>
-  <c:lang val="en-US"/>
+  <c:lang val="pt-BR"/>
   <c:roundedCorners val="0"/>
   <mc:AlternateContent xmlns:mc="http://schemas.openxmlformats.org/markup-compatibility/2006">
     <mc:Choice xmlns:c14="http://schemas.microsoft.com/office/drawing/2007/8/2/chart" Requires="c14">
@@ -2108,7 +2108,7 @@
                       <a:latin typeface="Bebas Kai" panose="04050603020B02020204" pitchFamily="82" charset="0"/>
                     </a:defRPr>
                   </a:pPr>
-                  <a:endParaRPr lang="en-US"/>
+                  <a:endParaRPr lang="pt-BR"/>
                 </a:p>
               </c:txPr>
               <c:dLblPos val="inEnd"/>
@@ -2161,7 +2161,7 @@
                       <a:cs typeface="+mn-cs"/>
                     </a:defRPr>
                   </a:pPr>
-                  <a:endParaRPr lang="en-US"/>
+                  <a:endParaRPr lang="pt-BR"/>
                 </a:p>
               </c:txPr>
               <c:dLblPos val="inEnd"/>
@@ -2212,7 +2212,7 @@
                     <a:cs typeface="+mn-cs"/>
                   </a:defRPr>
                 </a:pPr>
-                <a:endParaRPr lang="en-US"/>
+                <a:endParaRPr lang="pt-BR"/>
               </a:p>
             </c:txPr>
             <c:dLblPos val="inEnd"/>
@@ -2427,9 +2427,9 @@
                       <a:pPr>
                         <a:defRPr sz="2200"/>
                       </a:pPr>
-                      <a:t>[VALUE]</a:t>
+                      <a:t>[VALOR]</a:t>
                     </a:fld>
-                    <a:endParaRPr lang="en-US"/>
+                    <a:endParaRPr lang="pt-BR"/>
                   </a:p>
                 </c:rich>
               </c:tx>
@@ -2497,7 +2497,7 @@
                       <a:cs typeface="+mn-cs"/>
                     </a:defRPr>
                   </a:pPr>
-                  <a:endParaRPr lang="en-US"/>
+                  <a:endParaRPr lang="pt-BR"/>
                 </a:p>
               </c:txPr>
               <c:dLblPos val="inEnd"/>
@@ -2550,7 +2550,7 @@
                       <a:latin typeface="Bebas Kai" panose="04050603020B02020204" pitchFamily="82" charset="0"/>
                     </a:defRPr>
                   </a:pPr>
-                  <a:endParaRPr lang="en-US"/>
+                  <a:endParaRPr lang="pt-BR"/>
                 </a:p>
               </c:txPr>
               <c:dLblPos val="ctr"/>
@@ -2614,9 +2614,9 @@
                           <a:cs typeface="+mn-cs"/>
                         </a:defRPr>
                       </a:pPr>
-                      <a:t>[VALUE]</a:t>
+                      <a:t>[VALOR]</a:t>
                     </a:fld>
-                    <a:endParaRPr lang="en-US"/>
+                    <a:endParaRPr lang="pt-BR"/>
                   </a:p>
                 </c:rich>
               </c:tx>
@@ -2678,7 +2678,7 @@
                     <a:cs typeface="+mn-cs"/>
                   </a:defRPr>
                 </a:pPr>
-                <a:endParaRPr lang="en-US"/>
+                <a:endParaRPr lang="pt-BR"/>
               </a:p>
             </c:txPr>
             <c:dLblPos val="inEnd"/>
@@ -2837,7 +2837,7 @@
       <a:pPr>
         <a:defRPr/>
       </a:pPr>
-      <a:endParaRPr lang="en-US"/>
+      <a:endParaRPr lang="pt-BR"/>
     </a:p>
   </c:txPr>
   <c:externalData r:id="rId1">
@@ -2849,7 +2849,7 @@
 <file path=ppt/charts/chart4.xml><?xml version="1.0" encoding="utf-8"?>
 <c:chartSpace xmlns:c="http://schemas.openxmlformats.org/drawingml/2006/chart" xmlns:a="http://schemas.openxmlformats.org/drawingml/2006/main" xmlns:r="http://schemas.openxmlformats.org/officeDocument/2006/relationships" xmlns:c16r2="http://schemas.microsoft.com/office/drawing/2015/06/chart">
   <c:date1904 val="0"/>
-  <c:lang val="en-US"/>
+  <c:lang val="pt-BR"/>
   <c:roundedCorners val="0"/>
   <mc:AlternateContent xmlns:mc="http://schemas.openxmlformats.org/markup-compatibility/2006">
     <mc:Choice xmlns:c14="http://schemas.microsoft.com/office/drawing/2007/8/2/chart" Requires="c14">
@@ -3013,7 +3013,7 @@
                       <a:latin typeface="Bebas Kai" panose="04050603020B02020204" pitchFamily="82" charset="0"/>
                     </a:defRPr>
                   </a:pPr>
-                  <a:endParaRPr lang="en-US"/>
+                  <a:endParaRPr lang="pt-BR"/>
                 </a:p>
               </c:txPr>
               <c:dLblPos val="inEnd"/>
@@ -3066,7 +3066,7 @@
                       <a:cs typeface="+mn-cs"/>
                     </a:defRPr>
                   </a:pPr>
-                  <a:endParaRPr lang="en-US"/>
+                  <a:endParaRPr lang="pt-BR"/>
                 </a:p>
               </c:txPr>
               <c:dLblPos val="inEnd"/>
@@ -3123,7 +3123,7 @@
                     <a:cs typeface="+mn-cs"/>
                   </a:defRPr>
                 </a:pPr>
-                <a:endParaRPr lang="en-US"/>
+                <a:endParaRPr lang="pt-BR"/>
               </a:p>
             </c:txPr>
             <c:dLblPos val="inEnd"/>
@@ -3338,9 +3338,9 @@
                       <a:pPr>
                         <a:defRPr sz="2200"/>
                       </a:pPr>
-                      <a:t>[VALUE]</a:t>
+                      <a:t>[VALOR]</a:t>
                     </a:fld>
-                    <a:endParaRPr lang="en-US"/>
+                    <a:endParaRPr lang="pt-BR"/>
                   </a:p>
                 </c:rich>
               </c:tx>
@@ -3408,7 +3408,7 @@
                       <a:cs typeface="+mn-cs"/>
                     </a:defRPr>
                   </a:pPr>
-                  <a:endParaRPr lang="en-US"/>
+                  <a:endParaRPr lang="pt-BR"/>
                 </a:p>
               </c:txPr>
               <c:dLblPos val="inEnd"/>
@@ -3461,7 +3461,7 @@
                       <a:latin typeface="Bebas Kai" panose="04050603020B02020204" pitchFamily="82" charset="0"/>
                     </a:defRPr>
                   </a:pPr>
-                  <a:endParaRPr lang="en-US"/>
+                  <a:endParaRPr lang="pt-BR"/>
                 </a:p>
               </c:txPr>
               <c:dLblPos val="ctr"/>
@@ -3525,9 +3525,9 @@
                           <a:cs typeface="+mn-cs"/>
                         </a:defRPr>
                       </a:pPr>
-                      <a:t>[VALUE]</a:t>
+                      <a:t>[VALOR]</a:t>
                     </a:fld>
-                    <a:endParaRPr lang="en-US"/>
+                    <a:endParaRPr lang="pt-BR"/>
                   </a:p>
                 </c:rich>
               </c:tx>
@@ -3589,7 +3589,7 @@
                     <a:cs typeface="+mn-cs"/>
                   </a:defRPr>
                 </a:pPr>
-                <a:endParaRPr lang="en-US"/>
+                <a:endParaRPr lang="pt-BR"/>
               </a:p>
             </c:txPr>
             <c:dLblPos val="inEnd"/>
@@ -3748,7 +3748,7 @@
       <a:pPr>
         <a:defRPr/>
       </a:pPr>
-      <a:endParaRPr lang="en-US"/>
+      <a:endParaRPr lang="pt-BR"/>
     </a:p>
   </c:txPr>
   <c:externalData r:id="rId1">
@@ -3760,7 +3760,7 @@
 <file path=ppt/charts/chart5.xml><?xml version="1.0" encoding="utf-8"?>
 <c:chartSpace xmlns:c="http://schemas.openxmlformats.org/drawingml/2006/chart" xmlns:a="http://schemas.openxmlformats.org/drawingml/2006/main" xmlns:r="http://schemas.openxmlformats.org/officeDocument/2006/relationships" xmlns:c16r2="http://schemas.microsoft.com/office/drawing/2015/06/chart">
   <c:date1904 val="0"/>
-  <c:lang val="en-US"/>
+  <c:lang val="pt-BR"/>
   <c:roundedCorners val="0"/>
   <mc:AlternateContent xmlns:mc="http://schemas.openxmlformats.org/markup-compatibility/2006">
     <mc:Choice xmlns:c14="http://schemas.microsoft.com/office/drawing/2007/8/2/chart" Requires="c14">
@@ -3924,7 +3924,7 @@
                       <a:latin typeface="Bebas Kai" panose="04050603020B02020204" pitchFamily="82" charset="0"/>
                     </a:defRPr>
                   </a:pPr>
-                  <a:endParaRPr lang="en-US"/>
+                  <a:endParaRPr lang="pt-BR"/>
                 </a:p>
               </c:txPr>
               <c:dLblPos val="inEnd"/>
@@ -3983,7 +3983,7 @@
                       <a:cs typeface="+mn-cs"/>
                     </a:defRPr>
                   </a:pPr>
-                  <a:endParaRPr lang="en-US"/>
+                  <a:endParaRPr lang="pt-BR"/>
                 </a:p>
               </c:txPr>
               <c:dLblPos val="inEnd"/>
@@ -4040,7 +4040,7 @@
                     <a:cs typeface="+mn-cs"/>
                   </a:defRPr>
                 </a:pPr>
-                <a:endParaRPr lang="en-US"/>
+                <a:endParaRPr lang="pt-BR"/>
               </a:p>
             </c:txPr>
             <c:dLblPos val="inEnd"/>
@@ -4255,9 +4255,9 @@
                       <a:pPr>
                         <a:defRPr sz="2200"/>
                       </a:pPr>
-                      <a:t>[VALUE]</a:t>
+                      <a:t>[VALOR]</a:t>
                     </a:fld>
-                    <a:endParaRPr lang="en-US"/>
+                    <a:endParaRPr lang="pt-BR"/>
                   </a:p>
                 </c:rich>
               </c:tx>
@@ -4325,7 +4325,7 @@
                       <a:cs typeface="+mn-cs"/>
                     </a:defRPr>
                   </a:pPr>
-                  <a:endParaRPr lang="en-US"/>
+                  <a:endParaRPr lang="pt-BR"/>
                 </a:p>
               </c:txPr>
               <c:dLblPos val="inEnd"/>
@@ -4378,7 +4378,7 @@
                       <a:latin typeface="Bebas Kai" panose="04050603020B02020204" pitchFamily="82" charset="0"/>
                     </a:defRPr>
                   </a:pPr>
-                  <a:endParaRPr lang="en-US"/>
+                  <a:endParaRPr lang="pt-BR"/>
                 </a:p>
               </c:txPr>
               <c:dLblPos val="ctr"/>
@@ -4442,9 +4442,9 @@
                           <a:cs typeface="+mn-cs"/>
                         </a:defRPr>
                       </a:pPr>
-                      <a:t>[VALUE]</a:t>
+                      <a:t>[VALOR]</a:t>
                     </a:fld>
-                    <a:endParaRPr lang="en-US"/>
+                    <a:endParaRPr lang="pt-BR"/>
                   </a:p>
                 </c:rich>
               </c:tx>
@@ -4506,7 +4506,7 @@
                     <a:cs typeface="+mn-cs"/>
                   </a:defRPr>
                 </a:pPr>
-                <a:endParaRPr lang="en-US"/>
+                <a:endParaRPr lang="pt-BR"/>
               </a:p>
             </c:txPr>
             <c:dLblPos val="inEnd"/>
@@ -4665,7 +4665,7 @@
       <a:pPr>
         <a:defRPr/>
       </a:pPr>
-      <a:endParaRPr lang="en-US"/>
+      <a:endParaRPr lang="pt-BR"/>
     </a:p>
   </c:txPr>
   <c:externalData r:id="rId1">
@@ -4677,7 +4677,7 @@
 <file path=ppt/charts/chart6.xml><?xml version="1.0" encoding="utf-8"?>
 <c:chartSpace xmlns:c="http://schemas.openxmlformats.org/drawingml/2006/chart" xmlns:a="http://schemas.openxmlformats.org/drawingml/2006/main" xmlns:r="http://schemas.openxmlformats.org/officeDocument/2006/relationships" xmlns:c16r2="http://schemas.microsoft.com/office/drawing/2015/06/chart">
   <c:date1904 val="0"/>
-  <c:lang val="en-US"/>
+  <c:lang val="pt-BR"/>
   <c:roundedCorners val="0"/>
   <mc:AlternateContent xmlns:mc="http://schemas.openxmlformats.org/markup-compatibility/2006">
     <mc:Choice xmlns:c14="http://schemas.microsoft.com/office/drawing/2007/8/2/chart" Requires="c14">
@@ -4841,7 +4841,7 @@
                       <a:latin typeface="Bebas Kai" panose="04050603020B02020204" pitchFamily="82" charset="0"/>
                     </a:defRPr>
                   </a:pPr>
-                  <a:endParaRPr lang="en-US"/>
+                  <a:endParaRPr lang="pt-BR"/>
                 </a:p>
               </c:txPr>
               <c:dLblPos val="inEnd"/>
@@ -4894,7 +4894,7 @@
                       <a:cs typeface="+mn-cs"/>
                     </a:defRPr>
                   </a:pPr>
-                  <a:endParaRPr lang="en-US"/>
+                  <a:endParaRPr lang="pt-BR"/>
                 </a:p>
               </c:txPr>
               <c:dLblPos val="inEnd"/>
@@ -4945,7 +4945,7 @@
                     <a:cs typeface="+mn-cs"/>
                   </a:defRPr>
                 </a:pPr>
-                <a:endParaRPr lang="en-US"/>
+                <a:endParaRPr lang="pt-BR"/>
               </a:p>
             </c:txPr>
             <c:dLblPos val="inEnd"/>
@@ -5160,9 +5160,9 @@
                       <a:pPr>
                         <a:defRPr sz="2200"/>
                       </a:pPr>
-                      <a:t>[VALUE]</a:t>
+                      <a:t>[VALOR]</a:t>
                     </a:fld>
-                    <a:endParaRPr lang="en-US"/>
+                    <a:endParaRPr lang="pt-BR"/>
                   </a:p>
                 </c:rich>
               </c:tx>
@@ -5230,7 +5230,7 @@
                       <a:cs typeface="+mn-cs"/>
                     </a:defRPr>
                   </a:pPr>
-                  <a:endParaRPr lang="en-US"/>
+                  <a:endParaRPr lang="pt-BR"/>
                 </a:p>
               </c:txPr>
               <c:dLblPos val="inEnd"/>
@@ -5283,7 +5283,7 @@
                       <a:latin typeface="Bebas Kai" panose="04050603020B02020204" pitchFamily="82" charset="0"/>
                     </a:defRPr>
                   </a:pPr>
-                  <a:endParaRPr lang="en-US"/>
+                  <a:endParaRPr lang="pt-BR"/>
                 </a:p>
               </c:txPr>
               <c:dLblPos val="ctr"/>
@@ -5347,9 +5347,9 @@
                           <a:cs typeface="+mn-cs"/>
                         </a:defRPr>
                       </a:pPr>
-                      <a:t>[VALUE]</a:t>
+                      <a:t>[VALOR]</a:t>
                     </a:fld>
-                    <a:endParaRPr lang="en-US"/>
+                    <a:endParaRPr lang="pt-BR"/>
                   </a:p>
                 </c:rich>
               </c:tx>
@@ -5411,7 +5411,7 @@
                     <a:cs typeface="+mn-cs"/>
                   </a:defRPr>
                 </a:pPr>
-                <a:endParaRPr lang="en-US"/>
+                <a:endParaRPr lang="pt-BR"/>
               </a:p>
             </c:txPr>
             <c:dLblPos val="inEnd"/>
@@ -5570,7 +5570,7 @@
       <a:pPr>
         <a:defRPr/>
       </a:pPr>
-      <a:endParaRPr lang="en-US"/>
+      <a:endParaRPr lang="pt-BR"/>
     </a:p>
   </c:txPr>
   <c:externalData r:id="rId1">
@@ -5582,7 +5582,7 @@
 <file path=ppt/charts/chart7.xml><?xml version="1.0" encoding="utf-8"?>
 <c:chartSpace xmlns:c="http://schemas.openxmlformats.org/drawingml/2006/chart" xmlns:a="http://schemas.openxmlformats.org/drawingml/2006/main" xmlns:r="http://schemas.openxmlformats.org/officeDocument/2006/relationships" xmlns:c16r2="http://schemas.microsoft.com/office/drawing/2015/06/chart">
   <c:date1904 val="0"/>
-  <c:lang val="en-US"/>
+  <c:lang val="pt-BR"/>
   <c:roundedCorners val="0"/>
   <mc:AlternateContent xmlns:mc="http://schemas.openxmlformats.org/markup-compatibility/2006">
     <mc:Choice xmlns:c14="http://schemas.microsoft.com/office/drawing/2007/8/2/chart" Requires="c14">
@@ -5746,7 +5746,7 @@
                       <a:latin typeface="Bebas Kai" panose="04050603020B02020204" pitchFamily="82" charset="0"/>
                     </a:defRPr>
                   </a:pPr>
-                  <a:endParaRPr lang="en-US"/>
+                  <a:endParaRPr lang="pt-BR"/>
                 </a:p>
               </c:txPr>
               <c:dLblPos val="inEnd"/>
@@ -5799,7 +5799,7 @@
                       <a:cs typeface="+mn-cs"/>
                     </a:defRPr>
                   </a:pPr>
-                  <a:endParaRPr lang="en-US"/>
+                  <a:endParaRPr lang="pt-BR"/>
                 </a:p>
               </c:txPr>
               <c:dLblPos val="inEnd"/>
@@ -5850,7 +5850,7 @@
                     <a:cs typeface="+mn-cs"/>
                   </a:defRPr>
                 </a:pPr>
-                <a:endParaRPr lang="en-US"/>
+                <a:endParaRPr lang="pt-BR"/>
               </a:p>
             </c:txPr>
             <c:dLblPos val="inEnd"/>
@@ -6065,9 +6065,9 @@
                       <a:pPr>
                         <a:defRPr sz="2200"/>
                       </a:pPr>
-                      <a:t>[VALUE]</a:t>
+                      <a:t>[VALOR]</a:t>
                     </a:fld>
-                    <a:endParaRPr lang="en-US"/>
+                    <a:endParaRPr lang="pt-BR"/>
                   </a:p>
                 </c:rich>
               </c:tx>
@@ -6135,7 +6135,7 @@
                       <a:cs typeface="+mn-cs"/>
                     </a:defRPr>
                   </a:pPr>
-                  <a:endParaRPr lang="en-US"/>
+                  <a:endParaRPr lang="pt-BR"/>
                 </a:p>
               </c:txPr>
               <c:dLblPos val="inEnd"/>
@@ -6188,7 +6188,7 @@
                       <a:latin typeface="Bebas Kai" panose="04050603020B02020204" pitchFamily="82" charset="0"/>
                     </a:defRPr>
                   </a:pPr>
-                  <a:endParaRPr lang="en-US"/>
+                  <a:endParaRPr lang="pt-BR"/>
                 </a:p>
               </c:txPr>
               <c:dLblPos val="ctr"/>
@@ -6252,9 +6252,9 @@
                           <a:cs typeface="+mn-cs"/>
                         </a:defRPr>
                       </a:pPr>
-                      <a:t>[VALUE]</a:t>
+                      <a:t>[VALOR]</a:t>
                     </a:fld>
-                    <a:endParaRPr lang="en-US"/>
+                    <a:endParaRPr lang="pt-BR"/>
                   </a:p>
                 </c:rich>
               </c:tx>
@@ -6316,7 +6316,7 @@
                     <a:cs typeface="+mn-cs"/>
                   </a:defRPr>
                 </a:pPr>
-                <a:endParaRPr lang="en-US"/>
+                <a:endParaRPr lang="pt-BR"/>
               </a:p>
             </c:txPr>
             <c:dLblPos val="inEnd"/>
@@ -6475,7 +6475,7 @@
       <a:pPr>
         <a:defRPr/>
       </a:pPr>
-      <a:endParaRPr lang="en-US"/>
+      <a:endParaRPr lang="pt-BR"/>
     </a:p>
   </c:txPr>
   <c:externalData r:id="rId1">
@@ -6487,7 +6487,7 @@
 <file path=ppt/charts/chart8.xml><?xml version="1.0" encoding="utf-8"?>
 <c:chartSpace xmlns:c="http://schemas.openxmlformats.org/drawingml/2006/chart" xmlns:a="http://schemas.openxmlformats.org/drawingml/2006/main" xmlns:r="http://schemas.openxmlformats.org/officeDocument/2006/relationships" xmlns:c16r2="http://schemas.microsoft.com/office/drawing/2015/06/chart">
   <c:date1904 val="0"/>
-  <c:lang val="en-US"/>
+  <c:lang val="pt-BR"/>
   <c:roundedCorners val="0"/>
   <mc:AlternateContent xmlns:mc="http://schemas.openxmlformats.org/markup-compatibility/2006">
     <mc:Choice xmlns:c14="http://schemas.microsoft.com/office/drawing/2007/8/2/chart" Requires="c14">
@@ -6696,7 +6696,7 @@
                       <a:cs typeface="+mn-cs"/>
                     </a:defRPr>
                   </a:pPr>
-                  <a:endParaRPr lang="en-US"/>
+                  <a:endParaRPr lang="pt-BR"/>
                 </a:p>
               </c:txPr>
               <c:dLblPos val="outEnd"/>
@@ -6744,7 +6744,7 @@
                       <a:cs typeface="+mn-cs"/>
                     </a:defRPr>
                   </a:pPr>
-                  <a:endParaRPr lang="en-US"/>
+                  <a:endParaRPr lang="pt-BR"/>
                 </a:p>
               </c:txPr>
               <c:dLblPos val="outEnd"/>
@@ -6792,7 +6792,7 @@
                       <a:cs typeface="+mn-cs"/>
                     </a:defRPr>
                   </a:pPr>
-                  <a:endParaRPr lang="en-US"/>
+                  <a:endParaRPr lang="pt-BR"/>
                 </a:p>
               </c:txPr>
               <c:dLblPos val="outEnd"/>
@@ -6840,7 +6840,7 @@
                       <a:cs typeface="+mn-cs"/>
                     </a:defRPr>
                   </a:pPr>
-                  <a:endParaRPr lang="en-US"/>
+                  <a:endParaRPr lang="pt-BR"/>
                 </a:p>
               </c:txPr>
               <c:dLblPos val="outEnd"/>
@@ -6888,7 +6888,7 @@
                       <a:cs typeface="+mn-cs"/>
                     </a:defRPr>
                   </a:pPr>
-                  <a:endParaRPr lang="en-US"/>
+                  <a:endParaRPr lang="pt-BR"/>
                 </a:p>
               </c:txPr>
               <c:dLblPos val="outEnd"/>
@@ -6936,7 +6936,7 @@
                       <a:cs typeface="+mn-cs"/>
                     </a:defRPr>
                   </a:pPr>
-                  <a:endParaRPr lang="en-US"/>
+                  <a:endParaRPr lang="pt-BR"/>
                 </a:p>
               </c:txPr>
               <c:dLblPos val="outEnd"/>
@@ -6984,7 +6984,7 @@
                       <a:cs typeface="+mn-cs"/>
                     </a:defRPr>
                   </a:pPr>
-                  <a:endParaRPr lang="en-US"/>
+                  <a:endParaRPr lang="pt-BR"/>
                 </a:p>
               </c:txPr>
               <c:dLblPos val="outEnd"/>
@@ -7030,7 +7030,7 @@
                     <a:cs typeface="+mn-cs"/>
                   </a:defRPr>
                 </a:pPr>
-                <a:endParaRPr lang="en-US"/>
+                <a:endParaRPr lang="pt-BR"/>
               </a:p>
             </c:txPr>
             <c:dLblPos val="outEnd"/>
@@ -7317,7 +7317,7 @@
                     <a:cs typeface="+mn-cs"/>
                   </a:defRPr>
                 </a:pPr>
-                <a:endParaRPr lang="en-US"/>
+                <a:endParaRPr lang="pt-BR"/>
               </a:p>
             </c:txPr>
             <c:dLblPos val="ctr"/>
@@ -7757,7 +7757,7 @@
       <a:pPr>
         <a:defRPr/>
       </a:pPr>
-      <a:endParaRPr lang="en-US"/>
+      <a:endParaRPr lang="pt-BR"/>
     </a:p>
   </c:txPr>
   <c:externalData r:id="rId1">
@@ -7769,7 +7769,7 @@
 <file path=ppt/charts/chart9.xml><?xml version="1.0" encoding="utf-8"?>
 <c:chartSpace xmlns:c="http://schemas.openxmlformats.org/drawingml/2006/chart" xmlns:a="http://schemas.openxmlformats.org/drawingml/2006/main" xmlns:r="http://schemas.openxmlformats.org/officeDocument/2006/relationships" xmlns:c16r2="http://schemas.microsoft.com/office/drawing/2015/06/chart">
   <c:date1904 val="0"/>
-  <c:lang val="en-US"/>
+  <c:lang val="pt-BR"/>
   <c:roundedCorners val="0"/>
   <mc:AlternateContent xmlns:mc="http://schemas.openxmlformats.org/markup-compatibility/2006">
     <mc:Choice xmlns:c14="http://schemas.microsoft.com/office/drawing/2007/8/2/chart" Requires="c14">
@@ -7979,7 +7979,7 @@
                       <a:cs typeface="+mn-cs"/>
                     </a:defRPr>
                   </a:pPr>
-                  <a:endParaRPr lang="en-US"/>
+                  <a:endParaRPr lang="pt-BR"/>
                 </a:p>
               </c:txPr>
               <c:dLblPos val="outEnd"/>
@@ -8028,7 +8028,7 @@
                       <a:cs typeface="+mn-cs"/>
                     </a:defRPr>
                   </a:pPr>
-                  <a:endParaRPr lang="en-US"/>
+                  <a:endParaRPr lang="pt-BR"/>
                 </a:p>
               </c:txPr>
               <c:dLblPos val="outEnd"/>
@@ -8077,7 +8077,7 @@
                       <a:cs typeface="+mn-cs"/>
                     </a:defRPr>
                   </a:pPr>
-                  <a:endParaRPr lang="en-US"/>
+                  <a:endParaRPr lang="pt-BR"/>
                 </a:p>
               </c:txPr>
               <c:dLblPos val="outEnd"/>
@@ -8126,7 +8126,7 @@
                       <a:cs typeface="+mn-cs"/>
                     </a:defRPr>
                   </a:pPr>
-                  <a:endParaRPr lang="en-US"/>
+                  <a:endParaRPr lang="pt-BR"/>
                 </a:p>
               </c:txPr>
               <c:dLblPos val="outEnd"/>
@@ -8175,7 +8175,7 @@
                       <a:cs typeface="+mn-cs"/>
                     </a:defRPr>
                   </a:pPr>
-                  <a:endParaRPr lang="en-US"/>
+                  <a:endParaRPr lang="pt-BR"/>
                 </a:p>
               </c:txPr>
               <c:dLblPos val="outEnd"/>
@@ -8224,7 +8224,7 @@
                       <a:cs typeface="+mn-cs"/>
                     </a:defRPr>
                   </a:pPr>
-                  <a:endParaRPr lang="en-US"/>
+                  <a:endParaRPr lang="pt-BR"/>
                 </a:p>
               </c:txPr>
               <c:dLblPos val="outEnd"/>
@@ -8273,7 +8273,7 @@
                       <a:cs typeface="+mn-cs"/>
                     </a:defRPr>
                   </a:pPr>
-                  <a:endParaRPr lang="en-US"/>
+                  <a:endParaRPr lang="pt-BR"/>
                 </a:p>
               </c:txPr>
               <c:dLblPos val="outEnd"/>
@@ -8320,7 +8320,7 @@
                     <a:cs typeface="+mn-cs"/>
                   </a:defRPr>
                 </a:pPr>
-                <a:endParaRPr lang="en-US"/>
+                <a:endParaRPr lang="pt-BR"/>
               </a:p>
             </c:txPr>
             <c:dLblPos val="outEnd"/>
@@ -8608,7 +8608,7 @@
                     <a:cs typeface="+mn-cs"/>
                   </a:defRPr>
                 </a:pPr>
-                <a:endParaRPr lang="en-US"/>
+                <a:endParaRPr lang="pt-BR"/>
               </a:p>
             </c:txPr>
             <c:dLblPos val="ctr"/>
@@ -9048,7 +9048,7 @@
       <a:pPr>
         <a:defRPr/>
       </a:pPr>
-      <a:endParaRPr lang="en-US"/>
+      <a:endParaRPr lang="pt-BR"/>
     </a:p>
   </c:txPr>
   <c:externalData r:id="rId1">
@@ -9139,7 +9139,7 @@
           <a:p>
             <a:fld id="{9933228B-B5BA-5844-9E71-2BF823917A71}" type="datetimeFigureOut">
               <a:rPr lang="pt-BR" smtClean="0"/>
-              <a:t>20/06/2024</a:t>
+              <a:t>23/06/2024</a:t>
             </a:fld>
             <a:endParaRPr lang="pt-BR"/>
           </a:p>
@@ -9298,7 +9298,7 @@
           <a:p>
             <a:fld id="{F0ACF3E0-0754-3D47-9961-3FD558503D67}" type="slidenum">
               <a:rPr lang="pt-BR" smtClean="0"/>
-              <a:t>‹#›</a:t>
+              <a:t>‹nº›</a:t>
             </a:fld>
             <a:endParaRPr lang="pt-BR"/>
           </a:p>
@@ -28322,6 +28322,65 @@
           <a:chExt cx="0" cy="0"/>
         </a:xfrm>
       </p:grpSpPr>
+      <p:pic>
+        <p:nvPicPr>
+          <p:cNvPr id="37" name="Picture 32">
+            <a:extLst>
+              <a:ext uri="{FF2B5EF4-FFF2-40B4-BE49-F238E27FC236}">
+                <a16:creationId xmlns:a16="http://schemas.microsoft.com/office/drawing/2014/main" id="{FBF51EA8-B1FC-4DCB-C226-9B401D0F98D4}"/>
+              </a:ext>
+            </a:extLst>
+          </p:cNvPr>
+          <p:cNvPicPr>
+            <a:picLocks noChangeAspect="1"/>
+          </p:cNvPicPr>
+          <p:nvPr/>
+        </p:nvPicPr>
+        <p:blipFill>
+          <a:blip r:embed="rId3"/>
+          <a:srcRect/>
+          <a:stretch/>
+        </p:blipFill>
+        <p:spPr>
+          <a:xfrm>
+            <a:off x="6722552" y="952475"/>
+            <a:ext cx="5095858" cy="4981202"/>
+          </a:xfrm>
+          <a:prstGeom prst="rect">
+            <a:avLst/>
+          </a:prstGeom>
+        </p:spPr>
+      </p:pic>
+      <p:pic>
+        <p:nvPicPr>
+          <p:cNvPr id="36" name="Picture 30" descr="A white circle with blue circles and black text&#10;&#10;Description automatically generated">
+            <a:extLst>
+              <a:ext uri="{FF2B5EF4-FFF2-40B4-BE49-F238E27FC236}">
+                <a16:creationId xmlns:a16="http://schemas.microsoft.com/office/drawing/2014/main" id="{7A999233-DDAA-B24E-186A-461A6EC651A0}"/>
+              </a:ext>
+            </a:extLst>
+          </p:cNvPr>
+          <p:cNvPicPr>
+            <a:picLocks noChangeAspect="1"/>
+          </p:cNvPicPr>
+          <p:nvPr/>
+        </p:nvPicPr>
+        <p:blipFill>
+          <a:blip r:embed="rId4"/>
+          <a:stretch>
+            <a:fillRect/>
+          </a:stretch>
+        </p:blipFill>
+        <p:spPr>
+          <a:xfrm>
+            <a:off x="457151" y="949127"/>
+            <a:ext cx="5095859" cy="4981202"/>
+          </a:xfrm>
+          <a:prstGeom prst="rect">
+            <a:avLst/>
+          </a:prstGeom>
+        </p:spPr>
+      </p:pic>
       <p:sp>
         <p:nvSpPr>
           <p:cNvPr id="4" name="EmissõesAtualText">
@@ -28389,69 +28448,10 @@
       </p:sp>
       <p:pic>
         <p:nvPicPr>
-          <p:cNvPr id="7" name="Picture 6">
-            <a:extLst>
-              <a:ext uri="{FF2B5EF4-FFF2-40B4-BE49-F238E27FC236}">
-                <a16:creationId xmlns:a16="http://schemas.microsoft.com/office/drawing/2014/main" id="{D07CD35B-E9A0-7C2E-EEC1-B59E012C85BA}"/>
-              </a:ext>
-            </a:extLst>
-          </p:cNvPr>
-          <p:cNvPicPr>
-            <a:picLocks noChangeAspect="1"/>
-          </p:cNvPicPr>
-          <p:nvPr/>
-        </p:nvPicPr>
-        <p:blipFill>
-          <a:blip r:embed="rId3"/>
-          <a:srcRect/>
-          <a:stretch/>
-        </p:blipFill>
-        <p:spPr>
-          <a:xfrm>
-            <a:off x="6719999" y="938249"/>
-            <a:ext cx="4777368" cy="4981202"/>
-          </a:xfrm>
-          <a:prstGeom prst="rect">
-            <a:avLst/>
-          </a:prstGeom>
-        </p:spPr>
-      </p:pic>
-      <p:pic>
-        <p:nvPicPr>
           <p:cNvPr id="3" name="Picture 2" descr="A clock and arrow on a black background&#10;&#10;Description automatically generated">
             <a:extLst>
               <a:ext uri="{FF2B5EF4-FFF2-40B4-BE49-F238E27FC236}">
                 <a16:creationId xmlns:a16="http://schemas.microsoft.com/office/drawing/2014/main" id="{CE6E0C55-9B1D-60E4-0CFD-D74486A5603E}"/>
-              </a:ext>
-            </a:extLst>
-          </p:cNvPr>
-          <p:cNvPicPr>
-            <a:picLocks noChangeAspect="1"/>
-          </p:cNvPicPr>
-          <p:nvPr/>
-        </p:nvPicPr>
-        <p:blipFill>
-          <a:blip r:embed="rId4"/>
-          <a:stretch>
-            <a:fillRect/>
-          </a:stretch>
-        </p:blipFill>
-        <p:spPr>
-          <a:xfrm>
-            <a:off x="5679126" y="3035612"/>
-            <a:ext cx="936360" cy="975374"/>
-          </a:xfrm>
-          <a:prstGeom prst="rect">
-            <a:avLst/>
-          </a:prstGeom>
-        </p:spPr>
-      </p:pic>
-      <p:pic>
-        <p:nvPicPr>
-          <p:cNvPr id="5" name="Picture 4" descr="A white circle with blue circles and black background&#10;&#10;Description automatically generated">
-            <a:extLst>
-              <a:ext uri="{FF2B5EF4-FFF2-40B4-BE49-F238E27FC236}">
-                <a16:creationId xmlns:a16="http://schemas.microsoft.com/office/drawing/2014/main" id="{E052F439-DA84-3C21-22F4-73585AE68EBF}"/>
               </a:ext>
             </a:extLst>
           </p:cNvPr>
@@ -28468,8 +28468,8 @@
         </p:blipFill>
         <p:spPr>
           <a:xfrm>
-            <a:off x="819055" y="830318"/>
-            <a:ext cx="4725225" cy="5060932"/>
+            <a:off x="5679126" y="3035612"/>
+            <a:ext cx="936360" cy="975374"/>
           </a:xfrm>
           <a:prstGeom prst="rect">
             <a:avLst/>
@@ -28520,7 +28520,7 @@
         </p:nvSpPr>
         <p:spPr>
           <a:xfrm>
-            <a:off x="2773650" y="1875792"/>
+            <a:off x="2773650" y="1847217"/>
             <a:ext cx="914138" cy="353943"/>
           </a:xfrm>
           <a:prstGeom prst="rect">
@@ -28563,7 +28563,7 @@
         </p:nvSpPr>
         <p:spPr>
           <a:xfrm>
-            <a:off x="1993594" y="3076212"/>
+            <a:off x="1993594" y="3133362"/>
             <a:ext cx="914138" cy="353943"/>
           </a:xfrm>
           <a:prstGeom prst="rect">
@@ -28606,7 +28606,7 @@
         </p:nvSpPr>
         <p:spPr>
           <a:xfrm>
-            <a:off x="2049931" y="3938608"/>
+            <a:off x="2049931" y="3948133"/>
             <a:ext cx="914138" cy="353943"/>
           </a:xfrm>
           <a:prstGeom prst="rect">
@@ -28692,7 +28692,7 @@
         </p:nvSpPr>
         <p:spPr>
           <a:xfrm>
-            <a:off x="9360367" y="3676856"/>
+            <a:off x="9360367" y="3724481"/>
             <a:ext cx="2012578" cy="353943"/>
           </a:xfrm>
           <a:prstGeom prst="rect">
@@ -28734,7 +28734,7 @@
         </p:nvSpPr>
         <p:spPr>
           <a:xfrm>
-            <a:off x="9094740" y="4344735"/>
+            <a:off x="9113790" y="4344735"/>
             <a:ext cx="2012577" cy="353943"/>
           </a:xfrm>
           <a:prstGeom prst="rect">
@@ -28776,7 +28776,7 @@
         </p:nvSpPr>
         <p:spPr>
           <a:xfrm>
-            <a:off x="9395040" y="1771667"/>
+            <a:off x="9461715" y="1781192"/>
             <a:ext cx="1822930" cy="261610"/>
           </a:xfrm>
           <a:prstGeom prst="rect">
@@ -28818,7 +28818,7 @@
         </p:nvSpPr>
         <p:spPr>
           <a:xfrm>
-            <a:off x="8347429" y="1778324"/>
+            <a:off x="8404579" y="1778324"/>
             <a:ext cx="990272" cy="221760"/>
           </a:xfrm>
           <a:prstGeom prst="rect">
@@ -28957,7 +28957,7 @@
         </p:nvSpPr>
         <p:spPr>
           <a:xfrm>
-            <a:off x="9033781" y="2502802"/>
+            <a:off x="9100456" y="2502802"/>
             <a:ext cx="1087574" cy="249784"/>
           </a:xfrm>
           <a:prstGeom prst="rect">
@@ -29000,7 +29000,7 @@
         </p:nvSpPr>
         <p:spPr>
           <a:xfrm>
-            <a:off x="10199021" y="2515046"/>
+            <a:off x="10275221" y="2515046"/>
             <a:ext cx="1822931" cy="246221"/>
           </a:xfrm>
           <a:prstGeom prst="rect">
@@ -29359,7 +29359,7 @@
         </p:nvSpPr>
         <p:spPr>
           <a:xfrm>
-            <a:off x="9274112" y="2767294"/>
+            <a:off x="9255062" y="2729194"/>
             <a:ext cx="1298140" cy="246221"/>
           </a:xfrm>
           <a:prstGeom prst="rect">
@@ -29401,7 +29401,7 @@
         </p:nvSpPr>
         <p:spPr>
           <a:xfrm>
-            <a:off x="10610235" y="2748627"/>
+            <a:off x="10610235" y="2720052"/>
             <a:ext cx="1411717" cy="264888"/>
           </a:xfrm>
           <a:prstGeom prst="rect">
@@ -29424,7 +29424,29 @@
                 <a:ea typeface="Verdana" panose="020B0604030504040204" pitchFamily="34" charset="0"/>
                 <a:cs typeface="Calibri" panose="020F0502020204030204" pitchFamily="34" charset="0"/>
               </a:rPr>
-              <a:t>YY a YY Kton/a</a:t>
+              <a:t>YY a YY </a:t>
+            </a:r>
+            <a:r>
+              <a:rPr lang="pt-BR" sz="1700" b="1" dirty="0" err="1">
+                <a:solidFill>
+                  <a:srgbClr val="656565"/>
+                </a:solidFill>
+                <a:latin typeface="Calibri" panose="020F0502020204030204" pitchFamily="34" charset="0"/>
+                <a:ea typeface="Verdana" panose="020B0604030504040204" pitchFamily="34" charset="0"/>
+                <a:cs typeface="Calibri" panose="020F0502020204030204" pitchFamily="34" charset="0"/>
+              </a:rPr>
+              <a:t>Kt</a:t>
+            </a:r>
+            <a:r>
+              <a:rPr lang="pt-BR" sz="1700" b="1" dirty="0">
+                <a:solidFill>
+                  <a:srgbClr val="656565"/>
+                </a:solidFill>
+                <a:latin typeface="Calibri" panose="020F0502020204030204" pitchFamily="34" charset="0"/>
+                <a:ea typeface="Verdana" panose="020B0604030504040204" pitchFamily="34" charset="0"/>
+                <a:cs typeface="Calibri" panose="020F0502020204030204" pitchFamily="34" charset="0"/>
+              </a:rPr>
+              <a:t>/a</a:t>
             </a:r>
           </a:p>
         </p:txBody>
@@ -29443,7 +29465,7 @@
         </p:nvSpPr>
         <p:spPr>
           <a:xfrm>
-            <a:off x="7854793" y="5188709"/>
+            <a:off x="7683343" y="5188709"/>
             <a:ext cx="2463441" cy="353943"/>
           </a:xfrm>
           <a:prstGeom prst="rect">
@@ -29486,7 +29508,7 @@
         </p:nvSpPr>
         <p:spPr>
           <a:xfrm>
-            <a:off x="10176392" y="5185886"/>
+            <a:off x="10062092" y="5195411"/>
             <a:ext cx="1654143" cy="353943"/>
           </a:xfrm>
           <a:prstGeom prst="rect">
@@ -29538,10 +29560,10 @@
       </p:sp>
       <p:sp>
         <p:nvSpPr>
-          <p:cNvPr id="31" name="Rectangle 30">
-            <a:extLst>
-              <a:ext uri="{FF2B5EF4-FFF2-40B4-BE49-F238E27FC236}">
-                <a16:creationId xmlns:a16="http://schemas.microsoft.com/office/drawing/2014/main" id="{935F83B9-9AED-A7FB-A8E9-0056034A894C}"/>
+          <p:cNvPr id="34" name="Oval 33">
+            <a:extLst>
+              <a:ext uri="{FF2B5EF4-FFF2-40B4-BE49-F238E27FC236}">
+                <a16:creationId xmlns:a16="http://schemas.microsoft.com/office/drawing/2014/main" id="{0A3D8084-539F-B401-CDF3-7E85F05DFB7D}"/>
               </a:ext>
             </a:extLst>
           </p:cNvPr>
@@ -29549,11 +29571,11 @@
           <p:nvPr/>
         </p:nvSpPr>
         <p:spPr>
-          <a:xfrm>
-            <a:off x="1597931" y="2945672"/>
-            <a:ext cx="1309801" cy="220131"/>
-          </a:xfrm>
-          <a:prstGeom prst="rect">
+          <a:xfrm rot="1384220">
+            <a:off x="10045433" y="3517983"/>
+            <a:ext cx="130959" cy="97103"/>
+          </a:xfrm>
+          <a:prstGeom prst="ellipse">
             <a:avLst/>
           </a:prstGeom>
           <a:solidFill>
@@ -29585,191 +29607,6 @@
           <a:p>
             <a:pPr algn="ctr"/>
             <a:endParaRPr lang="en-US"/>
-          </a:p>
-        </p:txBody>
-      </p:sp>
-      <p:sp>
-        <p:nvSpPr>
-          <p:cNvPr id="30" name="CaixaDeTexto 19">
-            <a:extLst>
-              <a:ext uri="{FF2B5EF4-FFF2-40B4-BE49-F238E27FC236}">
-                <a16:creationId xmlns:a16="http://schemas.microsoft.com/office/drawing/2014/main" id="{1BD1FD8E-BE75-CCF8-6DA2-AA8C3732A417}"/>
-              </a:ext>
-            </a:extLst>
-          </p:cNvPr>
-          <p:cNvSpPr txBox="1"/>
-          <p:nvPr/>
-        </p:nvSpPr>
-        <p:spPr>
-          <a:xfrm>
-            <a:off x="367036" y="2933540"/>
-            <a:ext cx="2529041" cy="276999"/>
-          </a:xfrm>
-          <a:prstGeom prst="rect">
-            <a:avLst/>
-          </a:prstGeom>
-          <a:noFill/>
-        </p:spPr>
-        <p:txBody>
-          <a:bodyPr wrap="square" rtlCol="0">
-            <a:spAutoFit/>
-          </a:bodyPr>
-          <a:lstStyle/>
-          <a:p>
-            <a:pPr algn="r"/>
-            <a:r>
-              <a:rPr lang="pt-BR" sz="1200" b="1" dirty="0">
-                <a:solidFill>
-                  <a:srgbClr val="2390A1"/>
-                </a:solidFill>
-                <a:latin typeface="Arial Black" panose="020B0A04020102020204" pitchFamily="34" charset="0"/>
-              </a:rPr>
-              <a:t>DE RESÍDUOS ORGÂNICOS</a:t>
-            </a:r>
-          </a:p>
-        </p:txBody>
-      </p:sp>
-      <p:sp>
-        <p:nvSpPr>
-          <p:cNvPr id="33" name="Rectangle 32">
-            <a:extLst>
-              <a:ext uri="{FF2B5EF4-FFF2-40B4-BE49-F238E27FC236}">
-                <a16:creationId xmlns:a16="http://schemas.microsoft.com/office/drawing/2014/main" id="{E5983654-DC57-F95A-29A7-DC2655BE612F}"/>
-              </a:ext>
-            </a:extLst>
-          </p:cNvPr>
-          <p:cNvSpPr/>
-          <p:nvPr/>
-        </p:nvSpPr>
-        <p:spPr>
-          <a:xfrm>
-            <a:off x="9442082" y="3544110"/>
-            <a:ext cx="1298140" cy="162889"/>
-          </a:xfrm>
-          <a:prstGeom prst="rect">
-            <a:avLst/>
-          </a:prstGeom>
-          <a:solidFill>
-            <a:schemeClr val="bg1"/>
-          </a:solidFill>
-          <a:ln>
-            <a:noFill/>
-          </a:ln>
-        </p:spPr>
-        <p:style>
-          <a:lnRef idx="2">
-            <a:schemeClr val="accent1">
-              <a:shade val="15000"/>
-            </a:schemeClr>
-          </a:lnRef>
-          <a:fillRef idx="1">
-            <a:schemeClr val="accent1"/>
-          </a:fillRef>
-          <a:effectRef idx="0">
-            <a:schemeClr val="accent1"/>
-          </a:effectRef>
-          <a:fontRef idx="minor">
-            <a:schemeClr val="lt1"/>
-          </a:fontRef>
-        </p:style>
-        <p:txBody>
-          <a:bodyPr rtlCol="0" anchor="ctr"/>
-          <a:lstStyle/>
-          <a:p>
-            <a:pPr algn="ctr"/>
-            <a:endParaRPr lang="en-US"/>
-          </a:p>
-        </p:txBody>
-      </p:sp>
-      <p:sp>
-        <p:nvSpPr>
-          <p:cNvPr id="34" name="Oval 33">
-            <a:extLst>
-              <a:ext uri="{FF2B5EF4-FFF2-40B4-BE49-F238E27FC236}">
-                <a16:creationId xmlns:a16="http://schemas.microsoft.com/office/drawing/2014/main" id="{0A3D8084-539F-B401-CDF3-7E85F05DFB7D}"/>
-              </a:ext>
-            </a:extLst>
-          </p:cNvPr>
-          <p:cNvSpPr/>
-          <p:nvPr/>
-        </p:nvSpPr>
-        <p:spPr>
-          <a:xfrm rot="1384220">
-            <a:off x="10045433" y="3517983"/>
-            <a:ext cx="130959" cy="97103"/>
-          </a:xfrm>
-          <a:prstGeom prst="ellipse">
-            <a:avLst/>
-          </a:prstGeom>
-          <a:solidFill>
-            <a:schemeClr val="bg1"/>
-          </a:solidFill>
-          <a:ln>
-            <a:noFill/>
-          </a:ln>
-        </p:spPr>
-        <p:style>
-          <a:lnRef idx="2">
-            <a:schemeClr val="accent1">
-              <a:shade val="15000"/>
-            </a:schemeClr>
-          </a:lnRef>
-          <a:fillRef idx="1">
-            <a:schemeClr val="accent1"/>
-          </a:fillRef>
-          <a:effectRef idx="0">
-            <a:schemeClr val="accent1"/>
-          </a:effectRef>
-          <a:fontRef idx="minor">
-            <a:schemeClr val="lt1"/>
-          </a:fontRef>
-        </p:style>
-        <p:txBody>
-          <a:bodyPr rtlCol="0" anchor="ctr"/>
-          <a:lstStyle/>
-          <a:p>
-            <a:pPr algn="ctr"/>
-            <a:endParaRPr lang="en-US"/>
-          </a:p>
-        </p:txBody>
-      </p:sp>
-      <p:sp>
-        <p:nvSpPr>
-          <p:cNvPr id="35" name="CaixaDeTexto 30">
-            <a:extLst>
-              <a:ext uri="{FF2B5EF4-FFF2-40B4-BE49-F238E27FC236}">
-                <a16:creationId xmlns:a16="http://schemas.microsoft.com/office/drawing/2014/main" id="{72CF5B7A-49CE-C430-446A-956B84C7986D}"/>
-              </a:ext>
-            </a:extLst>
-          </p:cNvPr>
-          <p:cNvSpPr txBox="1"/>
-          <p:nvPr/>
-        </p:nvSpPr>
-        <p:spPr>
-          <a:xfrm>
-            <a:off x="9345714" y="3478491"/>
-            <a:ext cx="2529041" cy="276999"/>
-          </a:xfrm>
-          <a:prstGeom prst="rect">
-            <a:avLst/>
-          </a:prstGeom>
-          <a:noFill/>
-        </p:spPr>
-        <p:txBody>
-          <a:bodyPr wrap="square" rtlCol="0">
-            <a:spAutoFit/>
-          </a:bodyPr>
-          <a:lstStyle/>
-          <a:p>
-            <a:r>
-              <a:rPr lang="pt-BR" sz="1200" b="1" dirty="0">
-                <a:solidFill>
-                  <a:srgbClr val="F47F23"/>
-                </a:solidFill>
-                <a:latin typeface="Arial Black" panose="020B0A04020102020204" pitchFamily="34" charset="0"/>
-              </a:rPr>
-              <a:t>DE RESÍDUOS ORGÂNICOS</a:t>
-            </a:r>
           </a:p>
         </p:txBody>
       </p:sp>

</xml_diff>

<commit_message>
Corrigido os infográficos para melhor visualização
</commit_message>
<xml_diff>
--- a/templates/Infográficos.pptx
+++ b/templates/Infográficos.pptx
@@ -285,7 +285,7 @@
                 <a:effectLst/>
               </c:spPr>
               <c:txPr>
-                <a:bodyPr vertOverflow="overflow" horzOverflow="overflow" wrap="square" lIns="144000" tIns="72000" rIns="144000" bIns="72000" anchor="ctr">
+                <a:bodyPr vertOverflow="overflow" horzOverflow="overflow" wrap="square" lIns="72000" tIns="72000" rIns="72000" bIns="72000" anchor="ctr">
                   <a:spAutoFit/>
                 </a:bodyPr>
                 <a:lstStyle/>
@@ -315,6 +315,12 @@
                       <a:avLst/>
                     </a:prstGeom>
                   </c15:spPr>
+                  <c15:layout>
+                    <c:manualLayout>
+                      <c:w val="0.20164534779821597"/>
+                      <c:h val="0.17611783111160279"/>
+                    </c:manualLayout>
+                  </c15:layout>
                 </c:ext>
                 <c:ext xmlns:c16="http://schemas.microsoft.com/office/drawing/2014/chart" uri="{C3380CC4-5D6E-409C-BE32-E72D297353CC}">
                   <c16:uniqueId val="{00000009-A03C-4586-A1D7-0D34339B328E}"/>
@@ -336,7 +342,7 @@
                 <a:effectLst/>
               </c:spPr>
               <c:txPr>
-                <a:bodyPr rot="0" spcFirstLastPara="1" vertOverflow="overflow" horzOverflow="overflow" vert="horz" wrap="square" lIns="144000" tIns="72000" rIns="144000" bIns="72000" anchor="ctr" anchorCtr="1">
+                <a:bodyPr rot="0" spcFirstLastPara="1" vertOverflow="overflow" horzOverflow="overflow" vert="horz" wrap="square" lIns="72000" tIns="72000" rIns="72000" bIns="72000" anchor="ctr" anchorCtr="1">
                   <a:spAutoFit/>
                 </a:bodyPr>
                 <a:lstStyle/>
@@ -368,6 +374,12 @@
                       <a:avLst/>
                     </a:prstGeom>
                   </c15:spPr>
+                  <c15:layout>
+                    <c:manualLayout>
+                      <c:w val="0.20164534779821597"/>
+                      <c:h val="0.17611783111160279"/>
+                    </c:manualLayout>
+                  </c15:layout>
                 </c:ext>
                 <c:ext xmlns:c16="http://schemas.microsoft.com/office/drawing/2014/chart" uri="{C3380CC4-5D6E-409C-BE32-E72D297353CC}">
                   <c16:uniqueId val="{0000000B-A03C-4586-A1D7-0D34339B328E}"/>
@@ -387,7 +399,7 @@
               <a:effectLst/>
             </c:spPr>
             <c:txPr>
-              <a:bodyPr rot="0" spcFirstLastPara="1" vertOverflow="overflow" horzOverflow="overflow" vert="horz" wrap="square" lIns="108000" tIns="72000" rIns="108000" bIns="72000" anchor="ctr" anchorCtr="1">
+              <a:bodyPr rot="0" spcFirstLastPara="1" vertOverflow="overflow" horzOverflow="overflow" vert="horz" wrap="square" lIns="72000" tIns="72000" rIns="72000" bIns="72000" anchor="ctr" anchorCtr="1">
                 <a:spAutoFit/>
               </a:bodyPr>
               <a:lstStyle/>
@@ -473,10 +485,10 @@
                   <c:v>0</c:v>
                 </c:pt>
                 <c:pt idx="2">
-                  <c:v>884</c:v>
+                  <c:v>1000</c:v>
                 </c:pt>
                 <c:pt idx="3">
-                  <c:v>569</c:v>
+                  <c:v>1000</c:v>
                 </c:pt>
               </c:numCache>
             </c:numRef>
@@ -672,7 +684,7 @@
                 <a:effectLst/>
               </c:spPr>
               <c:txPr>
-                <a:bodyPr rot="0" spcFirstLastPara="1" vertOverflow="ellipsis" vert="horz" wrap="square" lIns="144000" tIns="72000" rIns="144000" bIns="72000" anchor="ctr" anchorCtr="1">
+                <a:bodyPr rot="0" spcFirstLastPara="1" vertOverflow="ellipsis" vert="horz" wrap="square" lIns="72000" tIns="72000" rIns="72000" bIns="72000" anchor="ctr" anchorCtr="1">
                   <a:spAutoFit/>
                 </a:bodyPr>
                 <a:lstStyle/>
@@ -917,16 +929,16 @@
                 <c:formatCode>General</c:formatCode>
                 <c:ptCount val="4"/>
                 <c:pt idx="0">
-                  <c:v>534</c:v>
+                  <c:v>1000</c:v>
                 </c:pt>
                 <c:pt idx="1">
-                  <c:v>930</c:v>
+                  <c:v>1100</c:v>
                 </c:pt>
                 <c:pt idx="2">
-                  <c:v>46</c:v>
+                  <c:v>100</c:v>
                 </c:pt>
                 <c:pt idx="3">
-                  <c:v>361</c:v>
+                  <c:v>100</c:v>
                 </c:pt>
               </c:numCache>
             </c:numRef>
@@ -1190,7 +1202,7 @@
                 <a:effectLst/>
               </c:spPr>
               <c:txPr>
-                <a:bodyPr vertOverflow="overflow" horzOverflow="overflow" wrap="square" lIns="144000" tIns="72000" rIns="144000" bIns="72000" anchor="ctr">
+                <a:bodyPr vertOverflow="overflow" horzOverflow="overflow" wrap="square" lIns="72000" tIns="72000" rIns="72000" bIns="72000" anchor="ctr">
                   <a:spAutoFit/>
                 </a:bodyPr>
                 <a:lstStyle/>
@@ -1220,6 +1232,12 @@
                       <a:avLst/>
                     </a:prstGeom>
                   </c15:spPr>
+                  <c15:layout>
+                    <c:manualLayout>
+                      <c:w val="0.20164534779821597"/>
+                      <c:h val="0.17611783111160279"/>
+                    </c:manualLayout>
+                  </c15:layout>
                 </c:ext>
                 <c:ext xmlns:c16="http://schemas.microsoft.com/office/drawing/2014/chart" uri="{C3380CC4-5D6E-409C-BE32-E72D297353CC}">
                   <c16:uniqueId val="{00000003-43E2-4441-A706-11C2153FC76C}"/>
@@ -1241,7 +1259,7 @@
                 <a:effectLst/>
               </c:spPr>
               <c:txPr>
-                <a:bodyPr rot="0" spcFirstLastPara="1" vertOverflow="overflow" horzOverflow="overflow" vert="horz" wrap="square" lIns="144000" tIns="72000" rIns="144000" bIns="72000" anchor="ctr" anchorCtr="1">
+                <a:bodyPr rot="0" spcFirstLastPara="1" vertOverflow="overflow" horzOverflow="overflow" vert="horz" wrap="square" lIns="72000" tIns="72000" rIns="72000" bIns="72000" anchor="ctr" anchorCtr="1">
                   <a:spAutoFit/>
                 </a:bodyPr>
                 <a:lstStyle/>
@@ -1273,6 +1291,12 @@
                       <a:avLst/>
                     </a:prstGeom>
                   </c15:spPr>
+                  <c15:layout>
+                    <c:manualLayout>
+                      <c:w val="0.20164534779821597"/>
+                      <c:h val="0.17611783111160279"/>
+                    </c:manualLayout>
+                  </c15:layout>
                 </c:ext>
                 <c:ext xmlns:c16="http://schemas.microsoft.com/office/drawing/2014/chart" uri="{C3380CC4-5D6E-409C-BE32-E72D297353CC}">
                   <c16:uniqueId val="{00000005-43E2-4441-A706-11C2153FC76C}"/>
@@ -1292,7 +1316,7 @@
               <a:effectLst/>
             </c:spPr>
             <c:txPr>
-              <a:bodyPr rot="0" spcFirstLastPara="1" vertOverflow="overflow" horzOverflow="overflow" vert="horz" wrap="square" lIns="108000" tIns="72000" rIns="108000" bIns="72000" anchor="ctr" anchorCtr="1">
+              <a:bodyPr rot="0" spcFirstLastPara="1" vertOverflow="overflow" horzOverflow="overflow" vert="horz" wrap="square" lIns="72000" tIns="72000" rIns="72000" bIns="72000" anchor="ctr" anchorCtr="1">
                 <a:spAutoFit/>
               </a:bodyPr>
               <a:lstStyle/>
@@ -1378,10 +1402,10 @@
                   <c:v>0</c:v>
                 </c:pt>
                 <c:pt idx="2">
-                  <c:v>904</c:v>
+                  <c:v>900</c:v>
                 </c:pt>
                 <c:pt idx="3">
-                  <c:v>582</c:v>
+                  <c:v>1000</c:v>
                 </c:pt>
               </c:numCache>
             </c:numRef>
@@ -1577,7 +1601,7 @@
                 <a:effectLst/>
               </c:spPr>
               <c:txPr>
-                <a:bodyPr rot="0" spcFirstLastPara="1" vertOverflow="ellipsis" vert="horz" wrap="square" lIns="144000" tIns="72000" rIns="144000" bIns="72000" anchor="ctr" anchorCtr="1">
+                <a:bodyPr rot="0" spcFirstLastPara="1" vertOverflow="ellipsis" vert="horz" wrap="square" lIns="72000" tIns="72000" rIns="72000" bIns="72000" anchor="ctr" anchorCtr="1">
                   <a:spAutoFit/>
                 </a:bodyPr>
                 <a:lstStyle/>
@@ -1664,8 +1688,8 @@
                   </c15:spPr>
                   <c15:layout>
                     <c:manualLayout>
-                      <c:w val="9.6021594189626649E-2"/>
-                      <c:h val="3.9302268286744976E-2"/>
+                      <c:w val="0.1600359903160444"/>
+                      <c:h val="7.8604536573489953E-2"/>
                     </c:manualLayout>
                   </c15:layout>
                 </c:ext>
@@ -1679,7 +1703,7 @@
               <c:tx>
                 <c:rich>
                   <a:bodyPr rot="0" spcFirstLastPara="1" vertOverflow="ellipsis" vert="horz" wrap="square" lIns="108000" tIns="72000" rIns="108000" bIns="72000" anchor="ctr" anchorCtr="1">
-                    <a:spAutoFit/>
+                    <a:noAutofit/>
                   </a:bodyPr>
                   <a:lstStyle/>
                   <a:p>
@@ -1737,6 +1761,12 @@
                       <a:avLst/>
                     </a:prstGeom>
                   </c15:spPr>
+                  <c15:layout>
+                    <c:manualLayout>
+                      <c:w val="0.1600359903160444"/>
+                      <c:h val="7.8604536573489953E-2"/>
+                    </c:manualLayout>
+                  </c15:layout>
                   <c15:dlblFieldTable/>
                   <c15:showDataLabelsRange val="0"/>
                 </c:ext>
@@ -1822,16 +1852,16 @@
                 <c:formatCode>General</c:formatCode>
                 <c:ptCount val="4"/>
                 <c:pt idx="0">
-                  <c:v>534</c:v>
+                  <c:v>1000</c:v>
                 </c:pt>
                 <c:pt idx="1">
-                  <c:v>930</c:v>
+                  <c:v>1100</c:v>
                 </c:pt>
                 <c:pt idx="2">
-                  <c:v>26</c:v>
+                  <c:v>200</c:v>
                 </c:pt>
                 <c:pt idx="3">
-                  <c:v>348</c:v>
+                  <c:v>100</c:v>
                 </c:pt>
               </c:numCache>
             </c:numRef>
@@ -2011,7 +2041,7 @@
             </c:spPr>
             <c:extLst>
               <c:ext xmlns:c16="http://schemas.microsoft.com/office/drawing/2014/chart" uri="{C3380CC4-5D6E-409C-BE32-E72D297353CC}">
-                <c16:uniqueId val="{00000001-B977-4EE4-B482-DC87818A29BE}"/>
+                <c16:uniqueId val="{00000001-245C-45DF-A287-38F00B941AFE}"/>
               </c:ext>
             </c:extLst>
           </c:dPt>
@@ -2030,7 +2060,7 @@
             </c:spPr>
             <c:extLst>
               <c:ext xmlns:c16="http://schemas.microsoft.com/office/drawing/2014/chart" uri="{C3380CC4-5D6E-409C-BE32-E72D297353CC}">
-                <c16:uniqueId val="{00000003-B977-4EE4-B482-DC87818A29BE}"/>
+                <c16:uniqueId val="{00000003-245C-45DF-A287-38F00B941AFE}"/>
               </c:ext>
             </c:extLst>
           </c:dPt>
@@ -2049,7 +2079,7 @@
             </c:spPr>
             <c:extLst>
               <c:ext xmlns:c16="http://schemas.microsoft.com/office/drawing/2014/chart" uri="{C3380CC4-5D6E-409C-BE32-E72D297353CC}">
-                <c16:uniqueId val="{00000005-B977-4EE4-B482-DC87818A29BE}"/>
+                <c16:uniqueId val="{00000005-245C-45DF-A287-38F00B941AFE}"/>
               </c:ext>
             </c:extLst>
           </c:dPt>
@@ -2067,7 +2097,7 @@
                   </c15:layout>
                 </c:ext>
                 <c:ext xmlns:c16="http://schemas.microsoft.com/office/drawing/2014/chart" uri="{C3380CC4-5D6E-409C-BE32-E72D297353CC}">
-                  <c16:uniqueId val="{00000001-B977-4EE4-B482-DC87818A29BE}"/>
+                  <c16:uniqueId val="{00000001-245C-45DF-A287-38F00B941AFE}"/>
                 </c:ext>
               </c:extLst>
             </c:dLbl>
@@ -2077,7 +2107,7 @@
               <c:extLst>
                 <c:ext xmlns:c15="http://schemas.microsoft.com/office/drawing/2012/chart" uri="{CE6537A1-D6FC-4f65-9D91-7224C49458BB}"/>
                 <c:ext xmlns:c16="http://schemas.microsoft.com/office/drawing/2014/chart" uri="{C3380CC4-5D6E-409C-BE32-E72D297353CC}">
-                  <c16:uniqueId val="{00000006-B977-4EE4-B482-DC87818A29BE}"/>
+                  <c16:uniqueId val="{00000006-245C-45DF-A287-38F00B941AFE}"/>
                 </c:ext>
               </c:extLst>
             </c:dLbl>
@@ -2095,7 +2125,7 @@
                 <a:effectLst/>
               </c:spPr>
               <c:txPr>
-                <a:bodyPr vertOverflow="overflow" horzOverflow="overflow" wrap="square" lIns="144000" tIns="72000" rIns="144000" bIns="72000" anchor="ctr">
+                <a:bodyPr vertOverflow="overflow" horzOverflow="overflow" wrap="square" lIns="72000" tIns="72000" rIns="72000" bIns="72000" anchor="ctr">
                   <a:spAutoFit/>
                 </a:bodyPr>
                 <a:lstStyle/>
@@ -2125,9 +2155,15 @@
                       <a:avLst/>
                     </a:prstGeom>
                   </c15:spPr>
+                  <c15:layout>
+                    <c:manualLayout>
+                      <c:w val="0.20164534779821597"/>
+                      <c:h val="0.17611783111160279"/>
+                    </c:manualLayout>
+                  </c15:layout>
                 </c:ext>
                 <c:ext xmlns:c16="http://schemas.microsoft.com/office/drawing/2014/chart" uri="{C3380CC4-5D6E-409C-BE32-E72D297353CC}">
-                  <c16:uniqueId val="{00000003-B977-4EE4-B482-DC87818A29BE}"/>
+                  <c16:uniqueId val="{00000003-245C-45DF-A287-38F00B941AFE}"/>
                 </c:ext>
               </c:extLst>
             </c:dLbl>
@@ -2146,7 +2182,7 @@
                 <a:effectLst/>
               </c:spPr>
               <c:txPr>
-                <a:bodyPr rot="0" spcFirstLastPara="1" vertOverflow="overflow" horzOverflow="overflow" vert="horz" wrap="square" lIns="144000" tIns="72000" rIns="144000" bIns="72000" anchor="ctr" anchorCtr="1">
+                <a:bodyPr rot="0" spcFirstLastPara="1" vertOverflow="overflow" horzOverflow="overflow" vert="horz" wrap="square" lIns="72000" tIns="72000" rIns="72000" bIns="72000" anchor="ctr" anchorCtr="1">
                   <a:spAutoFit/>
                 </a:bodyPr>
                 <a:lstStyle/>
@@ -2178,9 +2214,15 @@
                       <a:avLst/>
                     </a:prstGeom>
                   </c15:spPr>
+                  <c15:layout>
+                    <c:manualLayout>
+                      <c:w val="0.20164534779821597"/>
+                      <c:h val="0.17611783111160279"/>
+                    </c:manualLayout>
+                  </c15:layout>
                 </c:ext>
                 <c:ext xmlns:c16="http://schemas.microsoft.com/office/drawing/2014/chart" uri="{C3380CC4-5D6E-409C-BE32-E72D297353CC}">
-                  <c16:uniqueId val="{00000005-B977-4EE4-B482-DC87818A29BE}"/>
+                  <c16:uniqueId val="{00000005-245C-45DF-A287-38F00B941AFE}"/>
                 </c:ext>
               </c:extLst>
             </c:dLbl>
@@ -2197,7 +2239,7 @@
               <a:effectLst/>
             </c:spPr>
             <c:txPr>
-              <a:bodyPr rot="0" spcFirstLastPara="1" vertOverflow="overflow" horzOverflow="overflow" vert="horz" wrap="square" lIns="108000" tIns="72000" rIns="108000" bIns="72000" anchor="ctr" anchorCtr="1">
+              <a:bodyPr rot="0" spcFirstLastPara="1" vertOverflow="overflow" horzOverflow="overflow" vert="horz" wrap="square" lIns="72000" tIns="72000" rIns="72000" bIns="72000" anchor="ctr" anchorCtr="1">
                 <a:spAutoFit/>
               </a:bodyPr>
               <a:lstStyle/>
@@ -2283,17 +2325,17 @@
                   <c:v>0</c:v>
                 </c:pt>
                 <c:pt idx="2">
-                  <c:v>864</c:v>
+                  <c:v>900</c:v>
                 </c:pt>
                 <c:pt idx="3">
-                  <c:v>606</c:v>
+                  <c:v>1000</c:v>
                 </c:pt>
               </c:numCache>
             </c:numRef>
           </c:val>
           <c:extLst>
             <c:ext xmlns:c16="http://schemas.microsoft.com/office/drawing/2014/chart" uri="{C3380CC4-5D6E-409C-BE32-E72D297353CC}">
-              <c16:uniqueId val="{00000007-B977-4EE4-B482-DC87818A29BE}"/>
+              <c16:uniqueId val="{00000007-245C-45DF-A287-38F00B941AFE}"/>
             </c:ext>
           </c:extLst>
         </c:ser>
@@ -2336,7 +2378,7 @@
             </c:spPr>
             <c:extLst>
               <c:ext xmlns:c16="http://schemas.microsoft.com/office/drawing/2014/chart" uri="{C3380CC4-5D6E-409C-BE32-E72D297353CC}">
-                <c16:uniqueId val="{00000009-B977-4EE4-B482-DC87818A29BE}"/>
+                <c16:uniqueId val="{00000009-245C-45DF-A287-38F00B941AFE}"/>
               </c:ext>
             </c:extLst>
           </c:dPt>
@@ -2355,7 +2397,7 @@
             </c:spPr>
             <c:extLst>
               <c:ext xmlns:c16="http://schemas.microsoft.com/office/drawing/2014/chart" uri="{C3380CC4-5D6E-409C-BE32-E72D297353CC}">
-                <c16:uniqueId val="{0000000B-B977-4EE4-B482-DC87818A29BE}"/>
+                <c16:uniqueId val="{0000000B-245C-45DF-A287-38F00B941AFE}"/>
               </c:ext>
             </c:extLst>
           </c:dPt>
@@ -2377,7 +2419,7 @@
             </c:spPr>
             <c:extLst>
               <c:ext xmlns:c16="http://schemas.microsoft.com/office/drawing/2014/chart" uri="{C3380CC4-5D6E-409C-BE32-E72D297353CC}">
-                <c16:uniqueId val="{0000000D-B977-4EE4-B482-DC87818A29BE}"/>
+                <c16:uniqueId val="{0000000D-245C-45DF-A287-38F00B941AFE}"/>
               </c:ext>
             </c:extLst>
           </c:dPt>
@@ -2400,7 +2442,7 @@
             </c:spPr>
             <c:extLst>
               <c:ext xmlns:c16="http://schemas.microsoft.com/office/drawing/2014/chart" uri="{C3380CC4-5D6E-409C-BE32-E72D297353CC}">
-                <c16:uniqueId val="{0000000F-B977-4EE4-B482-DC87818A29BE}"/>
+                <c16:uniqueId val="{0000000F-245C-45DF-A287-38F00B941AFE}"/>
               </c:ext>
             </c:extLst>
           </c:dPt>
@@ -2463,7 +2505,7 @@
                   <c15:showDataLabelsRange val="0"/>
                 </c:ext>
                 <c:ext xmlns:c16="http://schemas.microsoft.com/office/drawing/2014/chart" uri="{C3380CC4-5D6E-409C-BE32-E72D297353CC}">
-                  <c16:uniqueId val="{00000009-B977-4EE4-B482-DC87818A29BE}"/>
+                  <c16:uniqueId val="{00000009-245C-45DF-A287-38F00B941AFE}"/>
                 </c:ext>
               </c:extLst>
             </c:dLbl>
@@ -2482,7 +2524,7 @@
                 <a:effectLst/>
               </c:spPr>
               <c:txPr>
-                <a:bodyPr rot="0" spcFirstLastPara="1" vertOverflow="ellipsis" vert="horz" wrap="square" lIns="144000" tIns="72000" rIns="144000" bIns="72000" anchor="ctr" anchorCtr="1">
+                <a:bodyPr rot="0" spcFirstLastPara="1" vertOverflow="ellipsis" vert="horz" wrap="square" lIns="72000" tIns="72000" rIns="72000" bIns="72000" anchor="ctr" anchorCtr="1">
                   <a:spAutoFit/>
                 </a:bodyPr>
                 <a:lstStyle/>
@@ -2522,7 +2564,7 @@
                   </c15:layout>
                 </c:ext>
                 <c:ext xmlns:c16="http://schemas.microsoft.com/office/drawing/2014/chart" uri="{C3380CC4-5D6E-409C-BE32-E72D297353CC}">
-                  <c16:uniqueId val="{0000000B-B977-4EE4-B482-DC87818A29BE}"/>
+                  <c16:uniqueId val="{0000000B-245C-45DF-A287-38F00B941AFE}"/>
                 </c:ext>
               </c:extLst>
             </c:dLbl>
@@ -2569,13 +2611,13 @@
                   </c15:spPr>
                   <c15:layout>
                     <c:manualLayout>
-                      <c:w val="9.6021594189626649E-2"/>
-                      <c:h val="3.9302268286744976E-2"/>
+                      <c:w val="0.1600359903160444"/>
+                      <c:h val="7.8604536573489953E-2"/>
                     </c:manualLayout>
                   </c15:layout>
                 </c:ext>
                 <c:ext xmlns:c16="http://schemas.microsoft.com/office/drawing/2014/chart" uri="{C3380CC4-5D6E-409C-BE32-E72D297353CC}">
-                  <c16:uniqueId val="{0000000D-B977-4EE4-B482-DC87818A29BE}"/>
+                  <c16:uniqueId val="{0000000D-245C-45DF-A287-38F00B941AFE}"/>
                 </c:ext>
               </c:extLst>
             </c:dLbl>
@@ -2584,7 +2626,7 @@
               <c:tx>
                 <c:rich>
                   <a:bodyPr rot="0" spcFirstLastPara="1" vertOverflow="ellipsis" vert="horz" wrap="square" lIns="108000" tIns="72000" rIns="108000" bIns="72000" anchor="ctr" anchorCtr="1">
-                    <a:spAutoFit/>
+                    <a:noAutofit/>
                   </a:bodyPr>
                   <a:lstStyle/>
                   <a:p>
@@ -2642,11 +2684,17 @@
                       <a:avLst/>
                     </a:prstGeom>
                   </c15:spPr>
+                  <c15:layout>
+                    <c:manualLayout>
+                      <c:w val="0.1600359903160444"/>
+                      <c:h val="7.8604536573489953E-2"/>
+                    </c:manualLayout>
+                  </c15:layout>
                   <c15:dlblFieldTable/>
                   <c15:showDataLabelsRange val="0"/>
                 </c:ext>
                 <c:ext xmlns:c16="http://schemas.microsoft.com/office/drawing/2014/chart" uri="{C3380CC4-5D6E-409C-BE32-E72D297353CC}">
-                  <c16:uniqueId val="{0000000F-B977-4EE4-B482-DC87818A29BE}"/>
+                  <c16:uniqueId val="{0000000F-245C-45DF-A287-38F00B941AFE}"/>
                 </c:ext>
               </c:extLst>
             </c:dLbl>
@@ -2727,23 +2775,23 @@
                 <c:formatCode>General</c:formatCode>
                 <c:ptCount val="4"/>
                 <c:pt idx="0">
-                  <c:v>534</c:v>
+                  <c:v>1000</c:v>
                 </c:pt>
                 <c:pt idx="1">
-                  <c:v>907</c:v>
+                  <c:v>1100</c:v>
                 </c:pt>
                 <c:pt idx="2">
-                  <c:v>43</c:v>
+                  <c:v>200</c:v>
                 </c:pt>
                 <c:pt idx="3">
-                  <c:v>301</c:v>
+                  <c:v>100</c:v>
                 </c:pt>
               </c:numCache>
             </c:numRef>
           </c:val>
           <c:extLst>
             <c:ext xmlns:c16="http://schemas.microsoft.com/office/drawing/2014/chart" uri="{C3380CC4-5D6E-409C-BE32-E72D297353CC}">
-              <c16:uniqueId val="{00000010-B977-4EE4-B482-DC87818A29BE}"/>
+              <c16:uniqueId val="{00000010-245C-45DF-A287-38F00B941AFE}"/>
             </c:ext>
           </c:extLst>
         </c:ser>
@@ -3000,7 +3048,7 @@
                 <a:effectLst/>
               </c:spPr>
               <c:txPr>
-                <a:bodyPr vertOverflow="overflow" horzOverflow="overflow" wrap="square" lIns="144000" tIns="72000" rIns="144000" bIns="72000" anchor="ctr">
+                <a:bodyPr vertOverflow="overflow" horzOverflow="overflow" wrap="square" lIns="72000" tIns="72000" rIns="72000" bIns="72000" anchor="ctr">
                   <a:spAutoFit/>
                 </a:bodyPr>
                 <a:lstStyle/>
@@ -3030,6 +3078,12 @@
                       <a:avLst/>
                     </a:prstGeom>
                   </c15:spPr>
+                  <c15:layout>
+                    <c:manualLayout>
+                      <c:w val="0.20164534779821597"/>
+                      <c:h val="0.17611783111160279"/>
+                    </c:manualLayout>
+                  </c15:layout>
                 </c:ext>
                 <c:ext xmlns:c16="http://schemas.microsoft.com/office/drawing/2014/chart" uri="{C3380CC4-5D6E-409C-BE32-E72D297353CC}">
                   <c16:uniqueId val="{00000003-E94C-4B63-B78A-3271D4CCB512}"/>
@@ -3051,7 +3105,7 @@
                 <a:effectLst/>
               </c:spPr>
               <c:txPr>
-                <a:bodyPr rot="0" spcFirstLastPara="1" vertOverflow="overflow" horzOverflow="overflow" vert="horz" wrap="square" lIns="144000" tIns="72000" rIns="144000" bIns="72000" anchor="ctr" anchorCtr="1">
+                <a:bodyPr rot="0" spcFirstLastPara="1" vertOverflow="overflow" horzOverflow="overflow" vert="horz" wrap="square" lIns="72000" tIns="72000" rIns="72000" bIns="72000" anchor="ctr" anchorCtr="1">
                   <a:spAutoFit/>
                 </a:bodyPr>
                 <a:lstStyle/>
@@ -3108,7 +3162,7 @@
               <a:effectLst/>
             </c:spPr>
             <c:txPr>
-              <a:bodyPr rot="0" spcFirstLastPara="1" vertOverflow="overflow" horzOverflow="overflow" vert="horz" wrap="square" lIns="108000" tIns="72000" rIns="108000" bIns="72000" anchor="ctr" anchorCtr="1">
+              <a:bodyPr rot="0" spcFirstLastPara="1" vertOverflow="overflow" horzOverflow="overflow" vert="horz" wrap="square" lIns="72000" tIns="72000" rIns="72000" bIns="72000" anchor="ctr" anchorCtr="1">
                 <a:spAutoFit/>
               </a:bodyPr>
               <a:lstStyle/>
@@ -3194,10 +3248,10 @@
                   <c:v>0</c:v>
                 </c:pt>
                 <c:pt idx="2">
-                  <c:v>823</c:v>
+                  <c:v>1000</c:v>
                 </c:pt>
                 <c:pt idx="3">
-                  <c:v>496</c:v>
+                  <c:v>1000</c:v>
                 </c:pt>
               </c:numCache>
             </c:numRef>
@@ -3393,7 +3447,7 @@
                 <a:effectLst/>
               </c:spPr>
               <c:txPr>
-                <a:bodyPr rot="0" spcFirstLastPara="1" vertOverflow="ellipsis" vert="horz" wrap="square" lIns="144000" tIns="72000" rIns="144000" bIns="72000" anchor="ctr" anchorCtr="1">
+                <a:bodyPr rot="0" spcFirstLastPara="1" vertOverflow="ellipsis" vert="horz" wrap="square" lIns="72000" tIns="72000" rIns="72000" bIns="72000" anchor="ctr" anchorCtr="1">
                   <a:spAutoFit/>
                 </a:bodyPr>
                 <a:lstStyle/>
@@ -3480,8 +3534,8 @@
                   </c15:spPr>
                   <c15:layout>
                     <c:manualLayout>
-                      <c:w val="9.6021594189626649E-2"/>
-                      <c:h val="3.9302268286744976E-2"/>
+                      <c:w val="0.1600359903160444"/>
+                      <c:h val="7.8604536573489953E-2"/>
                     </c:manualLayout>
                   </c15:layout>
                 </c:ext>
@@ -3495,7 +3549,7 @@
               <c:tx>
                 <c:rich>
                   <a:bodyPr rot="0" spcFirstLastPara="1" vertOverflow="ellipsis" vert="horz" wrap="square" lIns="108000" tIns="72000" rIns="108000" bIns="72000" anchor="ctr" anchorCtr="1">
-                    <a:spAutoFit/>
+                    <a:noAutofit/>
                   </a:bodyPr>
                   <a:lstStyle/>
                   <a:p>
@@ -3553,6 +3607,12 @@
                       <a:avLst/>
                     </a:prstGeom>
                   </c15:spPr>
+                  <c15:layout>
+                    <c:manualLayout>
+                      <c:w val="0.1600359903160444"/>
+                      <c:h val="7.8604536573489953E-2"/>
+                    </c:manualLayout>
+                  </c15:layout>
                   <c15:dlblFieldTable/>
                   <c15:showDataLabelsRange val="0"/>
                 </c:ext>
@@ -3638,16 +3698,16 @@
                 <c:formatCode>General</c:formatCode>
                 <c:ptCount val="4"/>
                 <c:pt idx="0">
-                  <c:v>534</c:v>
+                  <c:v>1000</c:v>
                 </c:pt>
                 <c:pt idx="1">
-                  <c:v>845</c:v>
+                  <c:v>1100</c:v>
                 </c:pt>
                 <c:pt idx="2">
-                  <c:v>22</c:v>
+                  <c:v>100</c:v>
                 </c:pt>
                 <c:pt idx="3">
-                  <c:v>349</c:v>
+                  <c:v>100</c:v>
                 </c:pt>
               </c:numCache>
             </c:numRef>
@@ -3911,7 +3971,7 @@
                 <a:effectLst/>
               </c:spPr>
               <c:txPr>
-                <a:bodyPr vertOverflow="overflow" horzOverflow="overflow" wrap="square" lIns="144000" tIns="72000" rIns="144000" bIns="72000" anchor="ctr">
+                <a:bodyPr vertOverflow="overflow" horzOverflow="overflow" wrap="square" lIns="72000" tIns="72000" rIns="72000" bIns="72000" anchor="ctr">
                   <a:noAutofit/>
                 </a:bodyPr>
                 <a:lstStyle/>
@@ -3968,7 +4028,7 @@
                 <a:effectLst/>
               </c:spPr>
               <c:txPr>
-                <a:bodyPr rot="0" spcFirstLastPara="1" vertOverflow="overflow" horzOverflow="overflow" vert="horz" wrap="square" lIns="144000" tIns="72000" rIns="144000" bIns="72000" anchor="ctr" anchorCtr="1">
+                <a:bodyPr rot="0" spcFirstLastPara="1" vertOverflow="overflow" horzOverflow="overflow" vert="horz" wrap="square" lIns="72000" tIns="72000" rIns="72000" bIns="72000" anchor="ctr" anchorCtr="1">
                   <a:spAutoFit/>
                 </a:bodyPr>
                 <a:lstStyle/>
@@ -4025,7 +4085,7 @@
               <a:effectLst/>
             </c:spPr>
             <c:txPr>
-              <a:bodyPr rot="0" spcFirstLastPara="1" vertOverflow="overflow" horzOverflow="overflow" vert="horz" wrap="square" lIns="108000" tIns="72000" rIns="108000" bIns="72000" anchor="ctr" anchorCtr="1">
+              <a:bodyPr rot="0" spcFirstLastPara="1" vertOverflow="overflow" horzOverflow="overflow" vert="horz" wrap="square" lIns="72000" tIns="72000" rIns="72000" bIns="72000" anchor="ctr" anchorCtr="1">
                 <a:spAutoFit/>
               </a:bodyPr>
               <a:lstStyle/>
@@ -4111,7 +4171,7 @@
                   <c:v>0</c:v>
                 </c:pt>
                 <c:pt idx="2">
-                  <c:v>1210</c:v>
+                  <c:v>1700</c:v>
                 </c:pt>
                 <c:pt idx="3">
                   <c:v>496</c:v>
@@ -4310,7 +4370,7 @@
                 <a:effectLst/>
               </c:spPr>
               <c:txPr>
-                <a:bodyPr rot="0" spcFirstLastPara="1" vertOverflow="ellipsis" vert="horz" wrap="square" lIns="144000" tIns="72000" rIns="144000" bIns="72000" anchor="ctr" anchorCtr="1">
+                <a:bodyPr rot="0" spcFirstLastPara="1" vertOverflow="ellipsis" vert="horz" wrap="square" lIns="72000" tIns="72000" rIns="72000" bIns="72000" anchor="ctr" anchorCtr="1">
                   <a:noAutofit/>
                 </a:bodyPr>
                 <a:lstStyle/>
@@ -4397,8 +4457,8 @@
                   </c15:spPr>
                   <c15:layout>
                     <c:manualLayout>
-                      <c:w val="9.6021594189626649E-2"/>
-                      <c:h val="3.9302268286744976E-2"/>
+                      <c:w val="0.1600359903160444"/>
+                      <c:h val="7.8604536573489953E-2"/>
                     </c:manualLayout>
                   </c15:layout>
                 </c:ext>
@@ -4412,7 +4472,7 @@
               <c:tx>
                 <c:rich>
                   <a:bodyPr rot="0" spcFirstLastPara="1" vertOverflow="ellipsis" vert="horz" wrap="square" lIns="108000" tIns="72000" rIns="108000" bIns="72000" anchor="ctr" anchorCtr="1">
-                    <a:spAutoFit/>
+                    <a:noAutofit/>
                   </a:bodyPr>
                   <a:lstStyle/>
                   <a:p>
@@ -4470,6 +4530,12 @@
                       <a:avLst/>
                     </a:prstGeom>
                   </c15:spPr>
+                  <c15:layout>
+                    <c:manualLayout>
+                      <c:w val="0.1600359903160444"/>
+                      <c:h val="7.8604536573489953E-2"/>
+                    </c:manualLayout>
+                  </c15:layout>
                   <c15:dlblFieldTable/>
                   <c15:showDataLabelsRange val="0"/>
                 </c:ext>
@@ -4561,7 +4627,7 @@
                   <c:v>1310</c:v>
                 </c:pt>
                 <c:pt idx="2">
-                  <c:v>100</c:v>
+                  <c:v>-390</c:v>
                 </c:pt>
                 <c:pt idx="3">
                   <c:v>814</c:v>
@@ -4610,7 +4676,6 @@
         <c:axId val="1087963984"/>
         <c:scaling>
           <c:orientation val="minMax"/>
-          <c:max val="1350"/>
           <c:min val="0"/>
         </c:scaling>
         <c:delete val="1"/>
@@ -4828,7 +4893,7 @@
                 <a:effectLst/>
               </c:spPr>
               <c:txPr>
-                <a:bodyPr vertOverflow="overflow" horzOverflow="overflow" wrap="square" lIns="144000" tIns="72000" rIns="144000" bIns="72000" anchor="ctr">
+                <a:bodyPr vertOverflow="overflow" horzOverflow="overflow" wrap="square" lIns="72000" tIns="72000" rIns="72000" bIns="72000" anchor="ctr">
                   <a:spAutoFit/>
                 </a:bodyPr>
                 <a:lstStyle/>
@@ -4858,6 +4923,12 @@
                       <a:avLst/>
                     </a:prstGeom>
                   </c15:spPr>
+                  <c15:layout>
+                    <c:manualLayout>
+                      <c:w val="0.20164534779821597"/>
+                      <c:h val="0.17611783111160279"/>
+                    </c:manualLayout>
+                  </c15:layout>
                 </c:ext>
                 <c:ext xmlns:c16="http://schemas.microsoft.com/office/drawing/2014/chart" uri="{C3380CC4-5D6E-409C-BE32-E72D297353CC}">
                   <c16:uniqueId val="{00000003-A5BE-4E2A-AE03-703016186A5A}"/>
@@ -4879,7 +4950,7 @@
                 <a:effectLst/>
               </c:spPr>
               <c:txPr>
-                <a:bodyPr rot="0" spcFirstLastPara="1" vertOverflow="overflow" horzOverflow="overflow" vert="horz" wrap="square" lIns="144000" tIns="72000" rIns="144000" bIns="72000" anchor="ctr" anchorCtr="1">
+                <a:bodyPr rot="0" spcFirstLastPara="1" vertOverflow="overflow" horzOverflow="overflow" vert="horz" wrap="square" lIns="72000" tIns="72000" rIns="72000" bIns="72000" anchor="ctr" anchorCtr="1">
                   <a:spAutoFit/>
                 </a:bodyPr>
                 <a:lstStyle/>
@@ -4911,6 +4982,12 @@
                       <a:avLst/>
                     </a:prstGeom>
                   </c15:spPr>
+                  <c15:layout>
+                    <c:manualLayout>
+                      <c:w val="0.20164534779821597"/>
+                      <c:h val="0.17611783111160279"/>
+                    </c:manualLayout>
+                  </c15:layout>
                 </c:ext>
                 <c:ext xmlns:c16="http://schemas.microsoft.com/office/drawing/2014/chart" uri="{C3380CC4-5D6E-409C-BE32-E72D297353CC}">
                   <c16:uniqueId val="{00000005-A5BE-4E2A-AE03-703016186A5A}"/>
@@ -4930,7 +5007,7 @@
               <a:effectLst/>
             </c:spPr>
             <c:txPr>
-              <a:bodyPr rot="0" spcFirstLastPara="1" vertOverflow="overflow" horzOverflow="overflow" vert="horz" wrap="square" lIns="108000" tIns="72000" rIns="108000" bIns="72000" anchor="ctr" anchorCtr="1">
+              <a:bodyPr rot="0" spcFirstLastPara="1" vertOverflow="overflow" horzOverflow="overflow" vert="horz" wrap="square" lIns="72000" tIns="72000" rIns="72000" bIns="72000" anchor="ctr" anchorCtr="1">
                 <a:spAutoFit/>
               </a:bodyPr>
               <a:lstStyle/>
@@ -5215,7 +5292,7 @@
                 <a:effectLst/>
               </c:spPr>
               <c:txPr>
-                <a:bodyPr rot="0" spcFirstLastPara="1" vertOverflow="ellipsis" vert="horz" wrap="square" lIns="144000" tIns="72000" rIns="144000" bIns="72000" anchor="ctr" anchorCtr="1">
+                <a:bodyPr rot="0" spcFirstLastPara="1" vertOverflow="ellipsis" vert="horz" wrap="square" lIns="72000" tIns="72000" rIns="72000" bIns="72000" anchor="ctr" anchorCtr="1">
                   <a:spAutoFit/>
                 </a:bodyPr>
                 <a:lstStyle/>
@@ -5302,8 +5379,8 @@
                   </c15:spPr>
                   <c15:layout>
                     <c:manualLayout>
-                      <c:w val="9.6021594189626649E-2"/>
-                      <c:h val="3.9302268286744976E-2"/>
+                      <c:w val="0.1600359903160444"/>
+                      <c:h val="7.8604536573489953E-2"/>
                     </c:manualLayout>
                   </c15:layout>
                 </c:ext>
@@ -5317,7 +5394,7 @@
               <c:tx>
                 <c:rich>
                   <a:bodyPr rot="0" spcFirstLastPara="1" vertOverflow="ellipsis" vert="horz" wrap="square" lIns="108000" tIns="72000" rIns="108000" bIns="72000" anchor="ctr" anchorCtr="1">
-                    <a:spAutoFit/>
+                    <a:noAutofit/>
                   </a:bodyPr>
                   <a:lstStyle/>
                   <a:p>
@@ -5375,6 +5452,12 @@
                       <a:avLst/>
                     </a:prstGeom>
                   </c15:spPr>
+                  <c15:layout>
+                    <c:manualLayout>
+                      <c:w val="0.1600359903160444"/>
+                      <c:h val="7.8604536573489953E-2"/>
+                    </c:manualLayout>
+                  </c15:layout>
                   <c15:dlblFieldTable/>
                   <c15:showDataLabelsRange val="0"/>
                 </c:ext>
@@ -9139,7 +9222,7 @@
           <a:p>
             <a:fld id="{9933228B-B5BA-5844-9E71-2BF823917A71}" type="datetimeFigureOut">
               <a:rPr lang="pt-BR" smtClean="0"/>
-              <a:t>23/06/2024</a:t>
+              <a:t>13/07/2024</a:t>
             </a:fld>
             <a:endParaRPr lang="pt-BR"/>
           </a:p>
@@ -11858,7 +11941,7 @@
           <p:nvPr>
             <p:extLst>
               <p:ext uri="{D42A27DB-BD31-4B8C-83A1-F6EECF244321}">
-                <p14:modId xmlns:p14="http://schemas.microsoft.com/office/powerpoint/2010/main" val="3392467709"/>
+                <p14:modId xmlns:p14="http://schemas.microsoft.com/office/powerpoint/2010/main" val="3342844734"/>
               </p:ext>
             </p:extLst>
           </p:nvPr>
@@ -13184,12 +13267,225 @@
           </a:prstGeom>
         </p:spPr>
       </p:pic>
+      <p:sp>
+        <p:nvSpPr>
+          <p:cNvPr id="3" name="CaixaDeTexto 2">
+            <a:extLst>
+              <a:ext uri="{FF2B5EF4-FFF2-40B4-BE49-F238E27FC236}">
+                <a16:creationId xmlns:a16="http://schemas.microsoft.com/office/drawing/2014/main" id="{1A63D33D-BA5B-95F2-45DC-68E38401A8DC}"/>
+              </a:ext>
+            </a:extLst>
+          </p:cNvPr>
+          <p:cNvSpPr txBox="1"/>
+          <p:nvPr/>
+        </p:nvSpPr>
+        <p:spPr>
+          <a:xfrm>
+            <a:off x="7590939" y="3738880"/>
+            <a:ext cx="862181" cy="276999"/>
+          </a:xfrm>
+          <a:prstGeom prst="rect">
+            <a:avLst/>
+          </a:prstGeom>
+          <a:noFill/>
+        </p:spPr>
+        <p:txBody>
+          <a:bodyPr wrap="square" rtlCol="0">
+            <a:spAutoFit/>
+          </a:bodyPr>
+          <a:lstStyle/>
+          <a:p>
+            <a:pPr algn="ctr"/>
+            <a:r>
+              <a:rPr lang="pt-BR" sz="1200" b="1" dirty="0">
+                <a:solidFill>
+                  <a:schemeClr val="bg1"/>
+                </a:solidFill>
+                <a:latin typeface="Calibri" panose="020F0502020204030204" pitchFamily="34" charset="0"/>
+                <a:ea typeface="Calibri" panose="020F0502020204030204" pitchFamily="34" charset="0"/>
+                <a:cs typeface="Calibri" panose="020F0502020204030204" pitchFamily="34" charset="0"/>
+              </a:rPr>
+              <a:t>R$/t RSU</a:t>
+            </a:r>
+          </a:p>
+        </p:txBody>
+      </p:sp>
+      <p:sp>
+        <p:nvSpPr>
+          <p:cNvPr id="4" name="CaixaDeTexto 3">
+            <a:extLst>
+              <a:ext uri="{FF2B5EF4-FFF2-40B4-BE49-F238E27FC236}">
+                <a16:creationId xmlns:a16="http://schemas.microsoft.com/office/drawing/2014/main" id="{6007D7BC-0785-4C15-1549-DC99FB22825E}"/>
+              </a:ext>
+            </a:extLst>
+          </p:cNvPr>
+          <p:cNvSpPr txBox="1"/>
+          <p:nvPr/>
+        </p:nvSpPr>
+        <p:spPr>
+          <a:xfrm>
+            <a:off x="8383419" y="3738880"/>
+            <a:ext cx="862181" cy="276999"/>
+          </a:xfrm>
+          <a:prstGeom prst="rect">
+            <a:avLst/>
+          </a:prstGeom>
+          <a:noFill/>
+        </p:spPr>
+        <p:txBody>
+          <a:bodyPr wrap="square" rtlCol="0">
+            <a:spAutoFit/>
+          </a:bodyPr>
+          <a:lstStyle/>
+          <a:p>
+            <a:pPr algn="ctr"/>
+            <a:r>
+              <a:rPr lang="pt-BR" sz="1200" b="1" dirty="0">
+                <a:solidFill>
+                  <a:schemeClr val="bg1"/>
+                </a:solidFill>
+                <a:latin typeface="Calibri" panose="020F0502020204030204" pitchFamily="34" charset="0"/>
+                <a:ea typeface="Calibri" panose="020F0502020204030204" pitchFamily="34" charset="0"/>
+                <a:cs typeface="Calibri" panose="020F0502020204030204" pitchFamily="34" charset="0"/>
+              </a:rPr>
+              <a:t>R$/t RSU</a:t>
+            </a:r>
+          </a:p>
+        </p:txBody>
+      </p:sp>
+      <p:sp>
+        <p:nvSpPr>
+          <p:cNvPr id="5" name="CaixaDeTexto 4">
+            <a:extLst>
+              <a:ext uri="{FF2B5EF4-FFF2-40B4-BE49-F238E27FC236}">
+                <a16:creationId xmlns:a16="http://schemas.microsoft.com/office/drawing/2014/main" id="{BC83810C-12D6-BBFD-6578-C7452155EC24}"/>
+              </a:ext>
+            </a:extLst>
+          </p:cNvPr>
+          <p:cNvSpPr txBox="1"/>
+          <p:nvPr/>
+        </p:nvSpPr>
+        <p:spPr>
+          <a:xfrm>
+            <a:off x="9175899" y="3738880"/>
+            <a:ext cx="862181" cy="276999"/>
+          </a:xfrm>
+          <a:prstGeom prst="rect">
+            <a:avLst/>
+          </a:prstGeom>
+          <a:noFill/>
+        </p:spPr>
+        <p:txBody>
+          <a:bodyPr wrap="square" rtlCol="0">
+            <a:spAutoFit/>
+          </a:bodyPr>
+          <a:lstStyle/>
+          <a:p>
+            <a:pPr algn="ctr"/>
+            <a:r>
+              <a:rPr lang="pt-BR" sz="1200" b="1" dirty="0">
+                <a:solidFill>
+                  <a:schemeClr val="bg1"/>
+                </a:solidFill>
+                <a:latin typeface="Calibri" panose="020F0502020204030204" pitchFamily="34" charset="0"/>
+                <a:ea typeface="Calibri" panose="020F0502020204030204" pitchFamily="34" charset="0"/>
+                <a:cs typeface="Calibri" panose="020F0502020204030204" pitchFamily="34" charset="0"/>
+              </a:rPr>
+              <a:t>R$/t RSU</a:t>
+            </a:r>
+          </a:p>
+        </p:txBody>
+      </p:sp>
+      <p:sp>
+        <p:nvSpPr>
+          <p:cNvPr id="6" name="CaixaDeTexto 5">
+            <a:extLst>
+              <a:ext uri="{FF2B5EF4-FFF2-40B4-BE49-F238E27FC236}">
+                <a16:creationId xmlns:a16="http://schemas.microsoft.com/office/drawing/2014/main" id="{0ACFFD5D-6EFD-E8E6-0038-B2858C61B9AD}"/>
+              </a:ext>
+            </a:extLst>
+          </p:cNvPr>
+          <p:cNvSpPr txBox="1"/>
+          <p:nvPr/>
+        </p:nvSpPr>
+        <p:spPr>
+          <a:xfrm>
+            <a:off x="9998859" y="3749040"/>
+            <a:ext cx="862181" cy="276999"/>
+          </a:xfrm>
+          <a:prstGeom prst="rect">
+            <a:avLst/>
+          </a:prstGeom>
+          <a:noFill/>
+        </p:spPr>
+        <p:txBody>
+          <a:bodyPr wrap="square" rtlCol="0">
+            <a:spAutoFit/>
+          </a:bodyPr>
+          <a:lstStyle/>
+          <a:p>
+            <a:pPr algn="ctr"/>
+            <a:r>
+              <a:rPr lang="pt-BR" sz="1200" b="1" dirty="0">
+                <a:solidFill>
+                  <a:schemeClr val="bg1"/>
+                </a:solidFill>
+                <a:latin typeface="Calibri" panose="020F0502020204030204" pitchFamily="34" charset="0"/>
+                <a:ea typeface="Calibri" panose="020F0502020204030204" pitchFamily="34" charset="0"/>
+                <a:cs typeface="Calibri" panose="020F0502020204030204" pitchFamily="34" charset="0"/>
+              </a:rPr>
+              <a:t>R$/t RSU</a:t>
+            </a:r>
+          </a:p>
+        </p:txBody>
+      </p:sp>
+      <p:sp>
+        <p:nvSpPr>
+          <p:cNvPr id="7" name="EstruturaCapital">
+            <a:extLst>
+              <a:ext uri="{FF2B5EF4-FFF2-40B4-BE49-F238E27FC236}">
+                <a16:creationId xmlns:a16="http://schemas.microsoft.com/office/drawing/2014/main" id="{FAF244AE-8243-F144-DD53-E8F6B84D5B09}"/>
+              </a:ext>
+            </a:extLst>
+          </p:cNvPr>
+          <p:cNvSpPr txBox="1"/>
+          <p:nvPr/>
+        </p:nvSpPr>
+        <p:spPr>
+          <a:xfrm>
+            <a:off x="5255171" y="6093615"/>
+            <a:ext cx="565061" cy="276999"/>
+          </a:xfrm>
+          <a:prstGeom prst="rect">
+            <a:avLst/>
+          </a:prstGeom>
+          <a:noFill/>
+        </p:spPr>
+        <p:txBody>
+          <a:bodyPr wrap="square" lIns="0" tIns="0" rIns="0" bIns="0" anchor="ctr" anchorCtr="0">
+            <a:noAutofit/>
+          </a:bodyPr>
+          <a:lstStyle/>
+          <a:p>
+            <a:pPr algn="r"/>
+            <a:r>
+              <a:rPr lang="pt-BR" sz="2200" dirty="0">
+                <a:solidFill>
+                  <a:srgbClr val="034F99"/>
+                </a:solidFill>
+                <a:latin typeface="Bebas Kai" pitchFamily="82" charset="77"/>
+              </a:rPr>
+              <a:t>75%</a:t>
+            </a:r>
+          </a:p>
+        </p:txBody>
+      </p:sp>
       <p:graphicFrame>
         <p:nvGraphicFramePr>
-          <p:cNvPr id="2" name="Gráfico">
-            <a:extLst>
-              <a:ext uri="{FF2B5EF4-FFF2-40B4-BE49-F238E27FC236}">
-                <a16:creationId xmlns:a16="http://schemas.microsoft.com/office/drawing/2014/main" id="{973D0759-57F8-F46B-F19A-3E630E698C40}"/>
+          <p:cNvPr id="8" name="Gráfico">
+            <a:extLst>
+              <a:ext uri="{FF2B5EF4-FFF2-40B4-BE49-F238E27FC236}">
+                <a16:creationId xmlns:a16="http://schemas.microsoft.com/office/drawing/2014/main" id="{FA6461F1-1C9D-A175-DFD8-6E0D88EB3B4A}"/>
               </a:ext>
               <a:ext uri="{C183D7F6-B498-43B3-948B-1728B52AA6E4}">
                 <adec:decorative xmlns:adec="http://schemas.microsoft.com/office/drawing/2017/decorative" val="0"/>
@@ -13200,7 +13496,7 @@
           <p:nvPr>
             <p:extLst>
               <p:ext uri="{D42A27DB-BD31-4B8C-83A1-F6EECF244321}">
-                <p14:modId xmlns:p14="http://schemas.microsoft.com/office/powerpoint/2010/main" val="1615316337"/>
+                <p14:modId xmlns:p14="http://schemas.microsoft.com/office/powerpoint/2010/main" val="2929548792"/>
               </p:ext>
             </p:extLst>
           </p:nvPr>
@@ -13215,219 +13511,6 @@
           </a:graphicData>
         </a:graphic>
       </p:graphicFrame>
-      <p:sp>
-        <p:nvSpPr>
-          <p:cNvPr id="3" name="CaixaDeTexto 2">
-            <a:extLst>
-              <a:ext uri="{FF2B5EF4-FFF2-40B4-BE49-F238E27FC236}">
-                <a16:creationId xmlns:a16="http://schemas.microsoft.com/office/drawing/2014/main" id="{1A63D33D-BA5B-95F2-45DC-68E38401A8DC}"/>
-              </a:ext>
-            </a:extLst>
-          </p:cNvPr>
-          <p:cNvSpPr txBox="1"/>
-          <p:nvPr/>
-        </p:nvSpPr>
-        <p:spPr>
-          <a:xfrm>
-            <a:off x="7590939" y="3738880"/>
-            <a:ext cx="862181" cy="276999"/>
-          </a:xfrm>
-          <a:prstGeom prst="rect">
-            <a:avLst/>
-          </a:prstGeom>
-          <a:noFill/>
-        </p:spPr>
-        <p:txBody>
-          <a:bodyPr wrap="square" rtlCol="0">
-            <a:spAutoFit/>
-          </a:bodyPr>
-          <a:lstStyle/>
-          <a:p>
-            <a:pPr algn="ctr"/>
-            <a:r>
-              <a:rPr lang="pt-BR" sz="1200" b="1" dirty="0">
-                <a:solidFill>
-                  <a:schemeClr val="bg1"/>
-                </a:solidFill>
-                <a:latin typeface="Calibri" panose="020F0502020204030204" pitchFamily="34" charset="0"/>
-                <a:ea typeface="Calibri" panose="020F0502020204030204" pitchFamily="34" charset="0"/>
-                <a:cs typeface="Calibri" panose="020F0502020204030204" pitchFamily="34" charset="0"/>
-              </a:rPr>
-              <a:t>R$/t RSU</a:t>
-            </a:r>
-          </a:p>
-        </p:txBody>
-      </p:sp>
-      <p:sp>
-        <p:nvSpPr>
-          <p:cNvPr id="4" name="CaixaDeTexto 3">
-            <a:extLst>
-              <a:ext uri="{FF2B5EF4-FFF2-40B4-BE49-F238E27FC236}">
-                <a16:creationId xmlns:a16="http://schemas.microsoft.com/office/drawing/2014/main" id="{6007D7BC-0785-4C15-1549-DC99FB22825E}"/>
-              </a:ext>
-            </a:extLst>
-          </p:cNvPr>
-          <p:cNvSpPr txBox="1"/>
-          <p:nvPr/>
-        </p:nvSpPr>
-        <p:spPr>
-          <a:xfrm>
-            <a:off x="8383419" y="3738880"/>
-            <a:ext cx="862181" cy="276999"/>
-          </a:xfrm>
-          <a:prstGeom prst="rect">
-            <a:avLst/>
-          </a:prstGeom>
-          <a:noFill/>
-        </p:spPr>
-        <p:txBody>
-          <a:bodyPr wrap="square" rtlCol="0">
-            <a:spAutoFit/>
-          </a:bodyPr>
-          <a:lstStyle/>
-          <a:p>
-            <a:pPr algn="ctr"/>
-            <a:r>
-              <a:rPr lang="pt-BR" sz="1200" b="1" dirty="0">
-                <a:solidFill>
-                  <a:schemeClr val="bg1"/>
-                </a:solidFill>
-                <a:latin typeface="Calibri" panose="020F0502020204030204" pitchFamily="34" charset="0"/>
-                <a:ea typeface="Calibri" panose="020F0502020204030204" pitchFamily="34" charset="0"/>
-                <a:cs typeface="Calibri" panose="020F0502020204030204" pitchFamily="34" charset="0"/>
-              </a:rPr>
-              <a:t>R$/t RSU</a:t>
-            </a:r>
-          </a:p>
-        </p:txBody>
-      </p:sp>
-      <p:sp>
-        <p:nvSpPr>
-          <p:cNvPr id="5" name="CaixaDeTexto 4">
-            <a:extLst>
-              <a:ext uri="{FF2B5EF4-FFF2-40B4-BE49-F238E27FC236}">
-                <a16:creationId xmlns:a16="http://schemas.microsoft.com/office/drawing/2014/main" id="{BC83810C-12D6-BBFD-6578-C7452155EC24}"/>
-              </a:ext>
-            </a:extLst>
-          </p:cNvPr>
-          <p:cNvSpPr txBox="1"/>
-          <p:nvPr/>
-        </p:nvSpPr>
-        <p:spPr>
-          <a:xfrm>
-            <a:off x="9175899" y="3738880"/>
-            <a:ext cx="862181" cy="276999"/>
-          </a:xfrm>
-          <a:prstGeom prst="rect">
-            <a:avLst/>
-          </a:prstGeom>
-          <a:noFill/>
-        </p:spPr>
-        <p:txBody>
-          <a:bodyPr wrap="square" rtlCol="0">
-            <a:spAutoFit/>
-          </a:bodyPr>
-          <a:lstStyle/>
-          <a:p>
-            <a:pPr algn="ctr"/>
-            <a:r>
-              <a:rPr lang="pt-BR" sz="1200" b="1" dirty="0">
-                <a:solidFill>
-                  <a:schemeClr val="bg1"/>
-                </a:solidFill>
-                <a:latin typeface="Calibri" panose="020F0502020204030204" pitchFamily="34" charset="0"/>
-                <a:ea typeface="Calibri" panose="020F0502020204030204" pitchFamily="34" charset="0"/>
-                <a:cs typeface="Calibri" panose="020F0502020204030204" pitchFamily="34" charset="0"/>
-              </a:rPr>
-              <a:t>R$/t RSU</a:t>
-            </a:r>
-          </a:p>
-        </p:txBody>
-      </p:sp>
-      <p:sp>
-        <p:nvSpPr>
-          <p:cNvPr id="6" name="CaixaDeTexto 5">
-            <a:extLst>
-              <a:ext uri="{FF2B5EF4-FFF2-40B4-BE49-F238E27FC236}">
-                <a16:creationId xmlns:a16="http://schemas.microsoft.com/office/drawing/2014/main" id="{0ACFFD5D-6EFD-E8E6-0038-B2858C61B9AD}"/>
-              </a:ext>
-            </a:extLst>
-          </p:cNvPr>
-          <p:cNvSpPr txBox="1"/>
-          <p:nvPr/>
-        </p:nvSpPr>
-        <p:spPr>
-          <a:xfrm>
-            <a:off x="9998859" y="3749040"/>
-            <a:ext cx="862181" cy="276999"/>
-          </a:xfrm>
-          <a:prstGeom prst="rect">
-            <a:avLst/>
-          </a:prstGeom>
-          <a:noFill/>
-        </p:spPr>
-        <p:txBody>
-          <a:bodyPr wrap="square" rtlCol="0">
-            <a:spAutoFit/>
-          </a:bodyPr>
-          <a:lstStyle/>
-          <a:p>
-            <a:pPr algn="ctr"/>
-            <a:r>
-              <a:rPr lang="pt-BR" sz="1200" b="1" dirty="0">
-                <a:solidFill>
-                  <a:schemeClr val="bg1"/>
-                </a:solidFill>
-                <a:latin typeface="Calibri" panose="020F0502020204030204" pitchFamily="34" charset="0"/>
-                <a:ea typeface="Calibri" panose="020F0502020204030204" pitchFamily="34" charset="0"/>
-                <a:cs typeface="Calibri" panose="020F0502020204030204" pitchFamily="34" charset="0"/>
-              </a:rPr>
-              <a:t>R$/t RSU</a:t>
-            </a:r>
-          </a:p>
-        </p:txBody>
-      </p:sp>
-      <p:sp>
-        <p:nvSpPr>
-          <p:cNvPr id="7" name="EstruturaCapital">
-            <a:extLst>
-              <a:ext uri="{FF2B5EF4-FFF2-40B4-BE49-F238E27FC236}">
-                <a16:creationId xmlns:a16="http://schemas.microsoft.com/office/drawing/2014/main" id="{FAF244AE-8243-F144-DD53-E8F6B84D5B09}"/>
-              </a:ext>
-            </a:extLst>
-          </p:cNvPr>
-          <p:cNvSpPr txBox="1"/>
-          <p:nvPr/>
-        </p:nvSpPr>
-        <p:spPr>
-          <a:xfrm>
-            <a:off x="5255171" y="6093615"/>
-            <a:ext cx="565061" cy="276999"/>
-          </a:xfrm>
-          <a:prstGeom prst="rect">
-            <a:avLst/>
-          </a:prstGeom>
-          <a:noFill/>
-        </p:spPr>
-        <p:txBody>
-          <a:bodyPr wrap="square" lIns="0" tIns="0" rIns="0" bIns="0" anchor="ctr" anchorCtr="0">
-            <a:noAutofit/>
-          </a:bodyPr>
-          <a:lstStyle/>
-          <a:p>
-            <a:pPr algn="r"/>
-            <a:r>
-              <a:rPr lang="pt-BR" sz="2200" dirty="0">
-                <a:solidFill>
-                  <a:srgbClr val="034F99"/>
-                </a:solidFill>
-                <a:latin typeface="Bebas Kai" pitchFamily="82" charset="77"/>
-              </a:rPr>
-              <a:t>75%</a:t>
-            </a:r>
-          </a:p>
-        </p:txBody>
-      </p:sp>
     </p:spTree>
     <p:extLst>
       <p:ext uri="{BB962C8B-B14F-4D97-AF65-F5344CB8AC3E}">
@@ -14635,7 +14718,7 @@
           <p:nvPr>
             <p:extLst>
               <p:ext uri="{D42A27DB-BD31-4B8C-83A1-F6EECF244321}">
-                <p14:modId xmlns:p14="http://schemas.microsoft.com/office/powerpoint/2010/main" val="2261035451"/>
+                <p14:modId xmlns:p14="http://schemas.microsoft.com/office/powerpoint/2010/main" val="245227313"/>
               </p:ext>
             </p:extLst>
           </p:nvPr>
@@ -16363,7 +16446,7 @@
           <p:nvPr>
             <p:extLst>
               <p:ext uri="{D42A27DB-BD31-4B8C-83A1-F6EECF244321}">
-                <p14:modId xmlns:p14="http://schemas.microsoft.com/office/powerpoint/2010/main" val="3232539665"/>
+                <p14:modId xmlns:p14="http://schemas.microsoft.com/office/powerpoint/2010/main" val="2641350702"/>
               </p:ext>
             </p:extLst>
           </p:nvPr>
@@ -16546,6 +16629,47 @@
                 <a:cs typeface="Calibri" panose="020F0502020204030204" pitchFamily="34" charset="0"/>
               </a:rPr>
               <a:t>R$/t RSU</a:t>
+            </a:r>
+          </a:p>
+        </p:txBody>
+      </p:sp>
+      <p:sp>
+        <p:nvSpPr>
+          <p:cNvPr id="22" name="TextBox 115">
+            <a:extLst>
+              <a:ext uri="{FF2B5EF4-FFF2-40B4-BE49-F238E27FC236}">
+                <a16:creationId xmlns:a16="http://schemas.microsoft.com/office/drawing/2014/main" id="{088A13A3-6F80-A785-84BF-D4D0E44AEA16}"/>
+              </a:ext>
+            </a:extLst>
+          </p:cNvPr>
+          <p:cNvSpPr txBox="1"/>
+          <p:nvPr/>
+        </p:nvSpPr>
+        <p:spPr>
+          <a:xfrm>
+            <a:off x="9229725" y="4196137"/>
+            <a:ext cx="1203325" cy="148047"/>
+          </a:xfrm>
+          <a:prstGeom prst="rect">
+            <a:avLst/>
+          </a:prstGeom>
+          <a:noFill/>
+        </p:spPr>
+        <p:txBody>
+          <a:bodyPr wrap="square" lIns="0" tIns="0" rIns="0" bIns="0" anchor="ctr" anchorCtr="0">
+            <a:noAutofit/>
+          </a:bodyPr>
+          <a:lstStyle/>
+          <a:p>
+            <a:pPr algn="ctr"/>
+            <a:r>
+              <a:rPr lang="pt-BR" sz="1400" b="1" dirty="0">
+                <a:solidFill>
+                  <a:schemeClr val="bg1"/>
+                </a:solidFill>
+                <a:latin typeface="Acumin VF Condensed" panose="020B0304020202020204" pitchFamily="34" charset="77"/>
+              </a:rPr>
+              <a:t>CONSÓRCIO</a:t>
             </a:r>
           </a:p>
         </p:txBody>
@@ -17883,7 +18007,7 @@
           <p:nvPr>
             <p:extLst>
               <p:ext uri="{D42A27DB-BD31-4B8C-83A1-F6EECF244321}">
-                <p14:modId xmlns:p14="http://schemas.microsoft.com/office/powerpoint/2010/main" val="2655794990"/>
+                <p14:modId xmlns:p14="http://schemas.microsoft.com/office/powerpoint/2010/main" val="2913784369"/>
               </p:ext>
             </p:extLst>
           </p:nvPr>
@@ -31338,7 +31462,7 @@
         </p:blipFill>
         <p:spPr>
           <a:xfrm>
-            <a:off x="8183034" y="1872708"/>
+            <a:off x="9276902" y="1872708"/>
             <a:ext cx="2110940" cy="1267813"/>
           </a:xfrm>
           <a:prstGeom prst="rect">
@@ -31368,7 +31492,7 @@
         </p:blipFill>
         <p:spPr>
           <a:xfrm>
-            <a:off x="5358172" y="1872708"/>
+            <a:off x="6221306" y="1872708"/>
             <a:ext cx="2654288" cy="1267813"/>
           </a:xfrm>
           <a:prstGeom prst="rect">
@@ -31509,7 +31633,7 @@
         <p:spPr>
           <a:xfrm>
             <a:off x="2289174" y="3179473"/>
-            <a:ext cx="3001899" cy="1024159"/>
+            <a:ext cx="3806826" cy="1024159"/>
           </a:xfrm>
           <a:prstGeom prst="rect">
             <a:avLst/>
@@ -31552,7 +31676,7 @@
         </p:nvSpPr>
         <p:spPr>
           <a:xfrm>
-            <a:off x="5466185" y="3190192"/>
+            <a:off x="6329319" y="3190192"/>
             <a:ext cx="1273281" cy="704169"/>
           </a:xfrm>
           <a:prstGeom prst="rect">
@@ -31597,7 +31721,7 @@
         </p:nvSpPr>
         <p:spPr>
           <a:xfrm>
-            <a:off x="8142735" y="3190192"/>
+            <a:off x="9236603" y="3190192"/>
             <a:ext cx="2110939" cy="704169"/>
           </a:xfrm>
           <a:prstGeom prst="rect">
@@ -31949,7 +32073,7 @@
         <p:spPr>
           <a:xfrm>
             <a:off x="2270680" y="4357996"/>
-            <a:ext cx="3001899" cy="1024159"/>
+            <a:ext cx="3825320" cy="1024159"/>
           </a:xfrm>
           <a:prstGeom prst="rect">
             <a:avLst/>
@@ -31992,7 +32116,7 @@
         </p:nvSpPr>
         <p:spPr>
           <a:xfrm>
-            <a:off x="5380750" y="4364236"/>
+            <a:off x="6243884" y="4364236"/>
             <a:ext cx="1381294" cy="704169"/>
           </a:xfrm>
           <a:prstGeom prst="rect">
@@ -32037,7 +32161,7 @@
         </p:nvSpPr>
         <p:spPr>
           <a:xfrm>
-            <a:off x="8140155" y="4364236"/>
+            <a:off x="9234023" y="4364236"/>
             <a:ext cx="2110939" cy="704169"/>
           </a:xfrm>
           <a:prstGeom prst="rect">
@@ -32053,7 +32177,7 @@
           <a:p>
             <a:pPr algn="ctr"/>
             <a:r>
-              <a:rPr lang="pt-BR" sz="1300">
+              <a:rPr lang="pt-BR" sz="1300" dirty="0">
                 <a:solidFill>
                   <a:schemeClr val="tx1">
                     <a:lumMod val="65000"/>
@@ -32065,16 +32189,6 @@
               </a:rPr>
               <a:t>Biguaçu.</a:t>
             </a:r>
-            <a:endParaRPr lang="pt-BR" sz="1300" dirty="0">
-              <a:solidFill>
-                <a:schemeClr val="tx1">
-                  <a:lumMod val="65000"/>
-                  <a:lumOff val="35000"/>
-                </a:schemeClr>
-              </a:solidFill>
-              <a:latin typeface="Acumin VF SemiCondensed" panose="020B0304020202020204" pitchFamily="34" charset="77"/>
-              <a:cs typeface="Arial" panose="020B0604020202020204" pitchFamily="34" charset="0"/>
-            </a:endParaRPr>
           </a:p>
         </p:txBody>
       </p:sp>
@@ -32093,7 +32207,7 @@
         <p:spPr>
           <a:xfrm>
             <a:off x="2270680" y="5548621"/>
-            <a:ext cx="3001899" cy="1024159"/>
+            <a:ext cx="3825320" cy="1024159"/>
           </a:xfrm>
           <a:prstGeom prst="rect">
             <a:avLst/>
@@ -32107,7 +32221,7 @@
           <a:lstStyle/>
           <a:p>
             <a:r>
-              <a:rPr lang="pt-BR" sz="1300">
+              <a:rPr lang="pt-BR" sz="1300" dirty="0">
                 <a:solidFill>
                   <a:schemeClr val="tx1">
                     <a:lumMod val="65000"/>
@@ -32119,16 +32233,6 @@
               </a:rPr>
               <a:t>YYY.</a:t>
             </a:r>
-            <a:endParaRPr lang="pt-BR" sz="1300" dirty="0">
-              <a:solidFill>
-                <a:schemeClr val="tx1">
-                  <a:lumMod val="65000"/>
-                  <a:lumOff val="35000"/>
-                </a:schemeClr>
-              </a:solidFill>
-              <a:latin typeface="Acumin VF SemiCondensed" panose="020B0304020202020204" pitchFamily="34" charset="77"/>
-              <a:cs typeface="Arial" panose="020B0604020202020204" pitchFamily="34" charset="0"/>
-            </a:endParaRPr>
           </a:p>
         </p:txBody>
       </p:sp>
@@ -32146,7 +32250,7 @@
         </p:nvSpPr>
         <p:spPr>
           <a:xfrm>
-            <a:off x="5354623" y="5548601"/>
+            <a:off x="6217757" y="5548601"/>
             <a:ext cx="1381294" cy="704169"/>
           </a:xfrm>
           <a:prstGeom prst="rect">
@@ -32191,7 +32295,7 @@
         </p:nvSpPr>
         <p:spPr>
           <a:xfrm>
-            <a:off x="8140155" y="5548602"/>
+            <a:off x="9234023" y="5548602"/>
             <a:ext cx="2110939" cy="328197"/>
           </a:xfrm>
           <a:prstGeom prst="rect">
@@ -33735,7 +33839,7 @@
           <p:nvPr>
             <p:extLst>
               <p:ext uri="{D42A27DB-BD31-4B8C-83A1-F6EECF244321}">
-                <p14:modId xmlns:p14="http://schemas.microsoft.com/office/powerpoint/2010/main" val="2537976292"/>
+                <p14:modId xmlns:p14="http://schemas.microsoft.com/office/powerpoint/2010/main" val="1728274103"/>
               </p:ext>
             </p:extLst>
           </p:nvPr>

</xml_diff>